<commit_message>
nearest sort results modification and pres
</commit_message>
<xml_diff>
--- a/moteur de recommandations de films.pptx
+++ b/moteur de recommandations de films.pptx
@@ -192,7 +192,7 @@
             <a:fld id="{2233D26B-DFC2-4248-8ED0-AD3E108CBDD7}" type="datetime1">
               <a:rPr lang="en-US" smtClean="0"/>
               <a:pPr/>
-              <a:t>11/16/2018</a:t>
+              <a:t>11/17/2018</a:t>
             </a:fld>
             <a:endParaRPr lang="en-US"/>
           </a:p>
@@ -235,7 +235,7 @@
             <a:fld id="{38237106-F2ED-405E-BC33-CC3CF426205F}" type="slidenum">
               <a:rPr lang="en-US" smtClean="0"/>
               <a:pPr/>
-              <a:t>‹#›</a:t>
+              <a:t>‹N°›</a:t>
             </a:fld>
             <a:endParaRPr lang="en-US"/>
           </a:p>
@@ -510,7 +510,7 @@
             <a:fld id="{E694C003-38E8-486A-9BFD-47E55D87241C}" type="datetime1">
               <a:rPr lang="en-US" smtClean="0"/>
               <a:pPr/>
-              <a:t>11/16/2018</a:t>
+              <a:t>11/17/2018</a:t>
             </a:fld>
             <a:endParaRPr lang="en-US"/>
           </a:p>
@@ -553,7 +553,7 @@
             <a:fld id="{38237106-F2ED-405E-BC33-CC3CF426205F}" type="slidenum">
               <a:rPr lang="en-US" smtClean="0"/>
               <a:pPr/>
-              <a:t>‹#›</a:t>
+              <a:t>‹N°›</a:t>
             </a:fld>
             <a:endParaRPr lang="en-US"/>
           </a:p>
@@ -687,7 +687,7 @@
             <a:fld id="{E059EAA3-934B-41DB-B3B1-806F4BE5CC37}" type="datetime1">
               <a:rPr lang="en-US" smtClean="0"/>
               <a:pPr/>
-              <a:t>11/16/2018</a:t>
+              <a:t>11/17/2018</a:t>
             </a:fld>
             <a:endParaRPr lang="en-US"/>
           </a:p>
@@ -730,7 +730,7 @@
             <a:fld id="{38237106-F2ED-405E-BC33-CC3CF426205F}" type="slidenum">
               <a:rPr lang="en-US" smtClean="0"/>
               <a:pPr/>
-              <a:t>‹#›</a:t>
+              <a:t>‹N°›</a:t>
             </a:fld>
             <a:endParaRPr lang="en-US"/>
           </a:p>
@@ -807,7 +807,7 @@
             <a:fld id="{8F97F932-D99A-4087-BFB1-EA42FAFC8D2C}" type="datetime1">
               <a:rPr lang="en-US" smtClean="0"/>
               <a:pPr/>
-              <a:t>11/16/2018</a:t>
+              <a:t>11/17/2018</a:t>
             </a:fld>
             <a:endParaRPr lang="en-US"/>
           </a:p>
@@ -850,7 +850,7 @@
             <a:fld id="{38237106-F2ED-405E-BC33-CC3CF426205F}" type="slidenum">
               <a:rPr lang="en-US" smtClean="0"/>
               <a:pPr/>
-              <a:t>‹#›</a:t>
+              <a:t>‹N°›</a:t>
             </a:fld>
             <a:endParaRPr lang="en-US"/>
           </a:p>
@@ -1107,7 +1107,7 @@
             <a:fld id="{79C96367-2F2B-4F6E-ACF4-15FA13738E10}" type="datetime1">
               <a:rPr lang="en-US" smtClean="0"/>
               <a:pPr/>
-              <a:t>11/16/2018</a:t>
+              <a:t>11/17/2018</a:t>
             </a:fld>
             <a:endParaRPr lang="en-US"/>
           </a:p>
@@ -1150,7 +1150,7 @@
             <a:fld id="{B1523C92-45F4-4C30-810D-4886C1BA6969}" type="slidenum">
               <a:rPr lang="en-US" smtClean="0"/>
               <a:pPr/>
-              <a:t>‹#›</a:t>
+              <a:t>‹N°›</a:t>
             </a:fld>
             <a:endParaRPr lang="en-US"/>
           </a:p>
@@ -1402,7 +1402,7 @@
             <a:fld id="{8FB3498D-21C7-408B-8EF5-5B55DEF0BFD5}" type="datetime1">
               <a:rPr lang="en-US" smtClean="0"/>
               <a:pPr/>
-              <a:t>11/16/2018</a:t>
+              <a:t>11/17/2018</a:t>
             </a:fld>
             <a:endParaRPr lang="en-US"/>
           </a:p>
@@ -1445,7 +1445,7 @@
             <a:fld id="{38237106-F2ED-405E-BC33-CC3CF426205F}" type="slidenum">
               <a:rPr lang="en-US" smtClean="0"/>
               <a:pPr/>
-              <a:t>‹#›</a:t>
+              <a:t>‹N°›</a:t>
             </a:fld>
             <a:endParaRPr lang="en-US"/>
           </a:p>
@@ -1832,7 +1832,7 @@
             <a:fld id="{84DB246E-8FD1-42FF-94A4-E4133095C37A}" type="datetime1">
               <a:rPr lang="en-US" smtClean="0"/>
               <a:pPr/>
-              <a:t>11/16/2018</a:t>
+              <a:t>11/17/2018</a:t>
             </a:fld>
             <a:endParaRPr lang="en-US"/>
           </a:p>
@@ -1875,7 +1875,7 @@
             <a:fld id="{38237106-F2ED-405E-BC33-CC3CF426205F}" type="slidenum">
               <a:rPr lang="en-US" smtClean="0"/>
               <a:pPr/>
-              <a:t>‹#›</a:t>
+              <a:t>‹N°›</a:t>
             </a:fld>
             <a:endParaRPr lang="en-US"/>
           </a:p>
@@ -1952,7 +1952,7 @@
             <a:fld id="{A93939D4-B818-4372-B1EE-7CB6D5BBC74A}" type="datetime1">
               <a:rPr lang="en-US" smtClean="0"/>
               <a:pPr/>
-              <a:t>11/16/2018</a:t>
+              <a:t>11/17/2018</a:t>
             </a:fld>
             <a:endParaRPr lang="en-US"/>
           </a:p>
@@ -1995,7 +1995,7 @@
             <a:fld id="{38237106-F2ED-405E-BC33-CC3CF426205F}" type="slidenum">
               <a:rPr lang="en-US" smtClean="0"/>
               <a:pPr/>
-              <a:t>‹#›</a:t>
+              <a:t>‹N°›</a:t>
             </a:fld>
             <a:endParaRPr lang="en-US"/>
           </a:p>
@@ -2044,7 +2044,7 @@
             <a:fld id="{2F35E438-4D0D-4834-B658-A90420491D98}" type="datetime1">
               <a:rPr lang="en-US" smtClean="0"/>
               <a:pPr/>
-              <a:t>11/16/2018</a:t>
+              <a:t>11/17/2018</a:t>
             </a:fld>
             <a:endParaRPr lang="en-US"/>
           </a:p>
@@ -2087,7 +2087,7 @@
             <a:fld id="{38237106-F2ED-405E-BC33-CC3CF426205F}" type="slidenum">
               <a:rPr lang="en-US" smtClean="0"/>
               <a:pPr/>
-              <a:t>‹#›</a:t>
+              <a:t>‹N°›</a:t>
             </a:fld>
             <a:endParaRPr lang="en-US"/>
           </a:p>
@@ -2296,7 +2296,7 @@
             <a:fld id="{76F8ADFA-7142-4015-85E6-1712F15FA709}" type="datetime1">
               <a:rPr lang="en-US" smtClean="0"/>
               <a:pPr/>
-              <a:t>11/16/2018</a:t>
+              <a:t>11/17/2018</a:t>
             </a:fld>
             <a:endParaRPr lang="en-US"/>
           </a:p>
@@ -2339,7 +2339,7 @@
             <a:fld id="{38237106-F2ED-405E-BC33-CC3CF426205F}" type="slidenum">
               <a:rPr lang="en-US" smtClean="0"/>
               <a:pPr/>
-              <a:t>‹#›</a:t>
+              <a:t>‹N°›</a:t>
             </a:fld>
             <a:endParaRPr lang="en-US"/>
           </a:p>
@@ -2814,7 +2814,7 @@
             <a:fld id="{34A581E0-D653-4D78-A48F-41D80498BC7E}" type="datetime1">
               <a:rPr lang="en-US" smtClean="0"/>
               <a:pPr/>
-              <a:t>11/16/2018</a:t>
+              <a:t>11/17/2018</a:t>
             </a:fld>
             <a:endParaRPr lang="en-US"/>
           </a:p>
@@ -2857,7 +2857,7 @@
             <a:fld id="{38237106-F2ED-405E-BC33-CC3CF426205F}" type="slidenum">
               <a:rPr lang="en-US" smtClean="0"/>
               <a:pPr/>
-              <a:t>‹#›</a:t>
+              <a:t>‹N°›</a:t>
             </a:fld>
             <a:endParaRPr lang="en-US"/>
           </a:p>
@@ -3046,7 +3046,7 @@
             <a:fld id="{8B3AFFF1-9C47-49F0-AE12-AF188F3F4E82}" type="datetime1">
               <a:rPr lang="en-US" smtClean="0"/>
               <a:pPr/>
-              <a:t>11/16/2018</a:t>
+              <a:t>11/17/2018</a:t>
             </a:fld>
             <a:endParaRPr lang="en-US" dirty="0"/>
           </a:p>
@@ -3121,7 +3121,7 @@
             <a:fld id="{38237106-F2ED-405E-BC33-CC3CF426205F}" type="slidenum">
               <a:rPr lang="en-US" smtClean="0"/>
               <a:pPr/>
-              <a:t>‹#›</a:t>
+              <a:t>‹N°›</a:t>
             </a:fld>
             <a:endParaRPr lang="en-US" dirty="0"/>
           </a:p>
@@ -3613,7 +3613,7 @@
     </p:spTree>
     <p:extLst>
       <p:ext uri="{BB962C8B-B14F-4D97-AF65-F5344CB8AC3E}">
-        <p14:creationId xmlns:p14="http://schemas.microsoft.com/office/powerpoint/2010/main" xmlns="" val="3468283249"/>
+        <p14:creationId xmlns:p14="http://schemas.microsoft.com/office/powerpoint/2010/main" val="3468283249"/>
       </p:ext>
     </p:extLst>
   </p:cSld>
@@ -3788,7 +3788,7 @@
           <a:blip r:embed="rId6" cstate="print">
             <a:extLst>
               <a:ext uri="{28A0092B-C50C-407E-A947-70E740481C1C}">
-                <a14:useLocalDpi xmlns:a14="http://schemas.microsoft.com/office/drawing/2010/main" xmlns="" val="0"/>
+                <a14:useLocalDpi xmlns:a14="http://schemas.microsoft.com/office/drawing/2010/main" val="0"/>
               </a:ext>
             </a:extLst>
           </a:blip>
@@ -3812,14 +3812,14 @@
           <a:effectLst/>
           <a:extLst>
             <a:ext uri="{909E8E84-426E-40DD-AFC4-6F175D3DCCD1}">
-              <a14:hiddenFill xmlns:a14="http://schemas.microsoft.com/office/drawing/2010/main" xmlns="">
+              <a14:hiddenFill xmlns:a14="http://schemas.microsoft.com/office/drawing/2010/main">
                 <a:solidFill>
                   <a:schemeClr val="accent1"/>
                 </a:solidFill>
               </a14:hiddenFill>
             </a:ext>
             <a:ext uri="{91240B29-F687-4F45-9708-019B960494DF}">
-              <a14:hiddenLine xmlns:a14="http://schemas.microsoft.com/office/drawing/2010/main" xmlns="" w="9525">
+              <a14:hiddenLine xmlns:a14="http://schemas.microsoft.com/office/drawing/2010/main" w="9525">
                 <a:solidFill>
                   <a:schemeClr val="tx1"/>
                 </a:solidFill>
@@ -3829,7 +3829,7 @@
               </a14:hiddenLine>
             </a:ext>
             <a:ext uri="{AF507438-7753-43E0-B8FC-AC1667EBCBE1}">
-              <a14:hiddenEffects xmlns:a14="http://schemas.microsoft.com/office/drawing/2010/main" xmlns="">
+              <a14:hiddenEffects xmlns:a14="http://schemas.microsoft.com/office/drawing/2010/main">
                 <a:effectLst>
                   <a:outerShdw dist="35921" dir="2700000" algn="ctr" rotWithShape="0">
                     <a:schemeClr val="bg2"/>
@@ -3856,7 +3856,7 @@
           <a:blip r:embed="rId7" cstate="print">
             <a:extLst>
               <a:ext uri="{28A0092B-C50C-407E-A947-70E740481C1C}">
-                <a14:useLocalDpi xmlns:a14="http://schemas.microsoft.com/office/drawing/2010/main" xmlns="" val="0"/>
+                <a14:useLocalDpi xmlns:a14="http://schemas.microsoft.com/office/drawing/2010/main" val="0"/>
               </a:ext>
             </a:extLst>
           </a:blip>
@@ -3880,14 +3880,14 @@
           <a:effectLst/>
           <a:extLst>
             <a:ext uri="{909E8E84-426E-40DD-AFC4-6F175D3DCCD1}">
-              <a14:hiddenFill xmlns:a14="http://schemas.microsoft.com/office/drawing/2010/main" xmlns="">
+              <a14:hiddenFill xmlns:a14="http://schemas.microsoft.com/office/drawing/2010/main">
                 <a:solidFill>
                   <a:schemeClr val="accent1"/>
                 </a:solidFill>
               </a14:hiddenFill>
             </a:ext>
             <a:ext uri="{91240B29-F687-4F45-9708-019B960494DF}">
-              <a14:hiddenLine xmlns:a14="http://schemas.microsoft.com/office/drawing/2010/main" xmlns="" w="9525">
+              <a14:hiddenLine xmlns:a14="http://schemas.microsoft.com/office/drawing/2010/main" w="9525">
                 <a:solidFill>
                   <a:schemeClr val="tx1"/>
                 </a:solidFill>
@@ -3897,7 +3897,7 @@
               </a14:hiddenLine>
             </a:ext>
             <a:ext uri="{AF507438-7753-43E0-B8FC-AC1667EBCBE1}">
-              <a14:hiddenEffects xmlns:a14="http://schemas.microsoft.com/office/drawing/2010/main" xmlns="">
+              <a14:hiddenEffects xmlns:a14="http://schemas.microsoft.com/office/drawing/2010/main">
                 <a:effectLst>
                   <a:outerShdw dist="35921" dir="2700000" algn="ctr" rotWithShape="0">
                     <a:schemeClr val="bg2"/>
@@ -3911,7 +3911,7 @@
     </p:spTree>
     <p:extLst>
       <p:ext uri="{BB962C8B-B14F-4D97-AF65-F5344CB8AC3E}">
-        <p14:creationId xmlns:p14="http://schemas.microsoft.com/office/powerpoint/2010/main" xmlns="" val="4043571853"/>
+        <p14:creationId xmlns:p14="http://schemas.microsoft.com/office/powerpoint/2010/main" val="4043571853"/>
       </p:ext>
     </p:extLst>
   </p:cSld>
@@ -4139,7 +4139,7 @@
     </p:spTree>
     <p:extLst>
       <p:ext uri="{BB962C8B-B14F-4D97-AF65-F5344CB8AC3E}">
-        <p14:creationId xmlns:p14="http://schemas.microsoft.com/office/powerpoint/2010/main" xmlns="" val="2764281191"/>
+        <p14:creationId xmlns:p14="http://schemas.microsoft.com/office/powerpoint/2010/main" val="2764281191"/>
       </p:ext>
     </p:extLst>
   </p:cSld>
@@ -4219,7 +4219,7 @@
     </p:spTree>
     <p:extLst>
       <p:ext uri="{BB962C8B-B14F-4D97-AF65-F5344CB8AC3E}">
-        <p14:creationId xmlns:p14="http://schemas.microsoft.com/office/powerpoint/2010/main" xmlns="" val="2134462054"/>
+        <p14:creationId xmlns:p14="http://schemas.microsoft.com/office/powerpoint/2010/main" val="2134462054"/>
       </p:ext>
     </p:extLst>
   </p:cSld>
@@ -4345,7 +4345,7 @@
     </p:spTree>
     <p:extLst>
       <p:ext uri="{BB962C8B-B14F-4D97-AF65-F5344CB8AC3E}">
-        <p14:creationId xmlns:p14="http://schemas.microsoft.com/office/powerpoint/2010/main" xmlns="" val="2364585716"/>
+        <p14:creationId xmlns:p14="http://schemas.microsoft.com/office/powerpoint/2010/main" val="2364585716"/>
       </p:ext>
     </p:extLst>
   </p:cSld>
@@ -4456,7 +4456,7 @@
           <a:blip r:embed="rId7" cstate="print">
             <a:extLst>
               <a:ext uri="{28A0092B-C50C-407E-A947-70E740481C1C}">
-                <a14:useLocalDpi xmlns:a14="http://schemas.microsoft.com/office/drawing/2010/main" xmlns="" val="0"/>
+                <a14:useLocalDpi xmlns:a14="http://schemas.microsoft.com/office/drawing/2010/main" val="0"/>
               </a:ext>
             </a:extLst>
           </a:blip>
@@ -4480,14 +4480,14 @@
           <a:effectLst/>
           <a:extLst>
             <a:ext uri="{909E8E84-426E-40DD-AFC4-6F175D3DCCD1}">
-              <a14:hiddenFill xmlns:a14="http://schemas.microsoft.com/office/drawing/2010/main" xmlns="">
+              <a14:hiddenFill xmlns:a14="http://schemas.microsoft.com/office/drawing/2010/main">
                 <a:solidFill>
                   <a:schemeClr val="accent1"/>
                 </a:solidFill>
               </a14:hiddenFill>
             </a:ext>
             <a:ext uri="{91240B29-F687-4F45-9708-019B960494DF}">
-              <a14:hiddenLine xmlns:a14="http://schemas.microsoft.com/office/drawing/2010/main" xmlns="" w="9525">
+              <a14:hiddenLine xmlns:a14="http://schemas.microsoft.com/office/drawing/2010/main" w="9525">
                 <a:solidFill>
                   <a:schemeClr val="tx1"/>
                 </a:solidFill>
@@ -4497,7 +4497,7 @@
               </a14:hiddenLine>
             </a:ext>
             <a:ext uri="{AF507438-7753-43E0-B8FC-AC1667EBCBE1}">
-              <a14:hiddenEffects xmlns:a14="http://schemas.microsoft.com/office/drawing/2010/main" xmlns="">
+              <a14:hiddenEffects xmlns:a14="http://schemas.microsoft.com/office/drawing/2010/main">
                 <a:effectLst>
                   <a:outerShdw dist="35921" dir="2700000" algn="ctr" rotWithShape="0">
                     <a:schemeClr val="bg2"/>
@@ -4616,7 +4616,7 @@
     </p:spTree>
     <p:extLst>
       <p:ext uri="{BB962C8B-B14F-4D97-AF65-F5344CB8AC3E}">
-        <p14:creationId xmlns:p14="http://schemas.microsoft.com/office/powerpoint/2010/main" xmlns="" val="1134370508"/>
+        <p14:creationId xmlns:p14="http://schemas.microsoft.com/office/powerpoint/2010/main" val="1134370508"/>
       </p:ext>
     </p:extLst>
   </p:cSld>
@@ -4739,7 +4739,7 @@
           <a:blip r:embed="rId5" cstate="print">
             <a:extLst>
               <a:ext uri="{28A0092B-C50C-407E-A947-70E740481C1C}">
-                <a14:useLocalDpi xmlns:a14="http://schemas.microsoft.com/office/drawing/2010/main" xmlns="" val="0"/>
+                <a14:useLocalDpi xmlns:a14="http://schemas.microsoft.com/office/drawing/2010/main" val="0"/>
               </a:ext>
             </a:extLst>
           </a:blip>
@@ -4763,14 +4763,14 @@
           <a:effectLst/>
           <a:extLst>
             <a:ext uri="{909E8E84-426E-40DD-AFC4-6F175D3DCCD1}">
-              <a14:hiddenFill xmlns:a14="http://schemas.microsoft.com/office/drawing/2010/main" xmlns="">
+              <a14:hiddenFill xmlns:a14="http://schemas.microsoft.com/office/drawing/2010/main">
                 <a:solidFill>
                   <a:schemeClr val="accent1"/>
                 </a:solidFill>
               </a14:hiddenFill>
             </a:ext>
             <a:ext uri="{91240B29-F687-4F45-9708-019B960494DF}">
-              <a14:hiddenLine xmlns:a14="http://schemas.microsoft.com/office/drawing/2010/main" xmlns="" w="9525">
+              <a14:hiddenLine xmlns:a14="http://schemas.microsoft.com/office/drawing/2010/main" w="9525">
                 <a:solidFill>
                   <a:schemeClr val="tx1"/>
                 </a:solidFill>
@@ -4780,7 +4780,7 @@
               </a14:hiddenLine>
             </a:ext>
             <a:ext uri="{AF507438-7753-43E0-B8FC-AC1667EBCBE1}">
-              <a14:hiddenEffects xmlns:a14="http://schemas.microsoft.com/office/drawing/2010/main" xmlns="">
+              <a14:hiddenEffects xmlns:a14="http://schemas.microsoft.com/office/drawing/2010/main">
                 <a:effectLst>
                   <a:outerShdw dist="35921" dir="2700000" algn="ctr" rotWithShape="0">
                     <a:schemeClr val="bg2"/>
@@ -4794,7 +4794,7 @@
     </p:spTree>
     <p:extLst>
       <p:ext uri="{BB962C8B-B14F-4D97-AF65-F5344CB8AC3E}">
-        <p14:creationId xmlns:p14="http://schemas.microsoft.com/office/powerpoint/2010/main" xmlns="" val="3352962733"/>
+        <p14:creationId xmlns:p14="http://schemas.microsoft.com/office/powerpoint/2010/main" val="3352962733"/>
       </p:ext>
     </p:extLst>
   </p:cSld>
@@ -4844,7 +4844,7 @@
           <a:blip r:embed="rId4" cstate="print">
             <a:extLst>
               <a:ext uri="{28A0092B-C50C-407E-A947-70E740481C1C}">
-                <a14:useLocalDpi xmlns:a14="http://schemas.microsoft.com/office/drawing/2010/main" xmlns="" val="0"/>
+                <a14:useLocalDpi xmlns:a14="http://schemas.microsoft.com/office/drawing/2010/main" val="0"/>
               </a:ext>
             </a:extLst>
           </a:blip>
@@ -4868,14 +4868,14 @@
           <a:effectLst/>
           <a:extLst>
             <a:ext uri="{909E8E84-426E-40DD-AFC4-6F175D3DCCD1}">
-              <a14:hiddenFill xmlns:a14="http://schemas.microsoft.com/office/drawing/2010/main" xmlns="">
+              <a14:hiddenFill xmlns:a14="http://schemas.microsoft.com/office/drawing/2010/main">
                 <a:solidFill>
                   <a:schemeClr val="accent1"/>
                 </a:solidFill>
               </a14:hiddenFill>
             </a:ext>
             <a:ext uri="{91240B29-F687-4F45-9708-019B960494DF}">
-              <a14:hiddenLine xmlns:a14="http://schemas.microsoft.com/office/drawing/2010/main" xmlns="" w="9525">
+              <a14:hiddenLine xmlns:a14="http://schemas.microsoft.com/office/drawing/2010/main" w="9525">
                 <a:solidFill>
                   <a:schemeClr val="tx1"/>
                 </a:solidFill>
@@ -4885,7 +4885,7 @@
               </a14:hiddenLine>
             </a:ext>
             <a:ext uri="{AF507438-7753-43E0-B8FC-AC1667EBCBE1}">
-              <a14:hiddenEffects xmlns:a14="http://schemas.microsoft.com/office/drawing/2010/main" xmlns="">
+              <a14:hiddenEffects xmlns:a14="http://schemas.microsoft.com/office/drawing/2010/main">
                 <a:effectLst>
                   <a:outerShdw dist="35921" dir="2700000" algn="ctr" rotWithShape="0">
                     <a:schemeClr val="bg2"/>
@@ -4945,7 +4945,7 @@
     </p:spTree>
     <p:extLst>
       <p:ext uri="{BB962C8B-B14F-4D97-AF65-F5344CB8AC3E}">
-        <p14:creationId xmlns:p14="http://schemas.microsoft.com/office/powerpoint/2010/main" xmlns="" val="2816162945"/>
+        <p14:creationId xmlns:p14="http://schemas.microsoft.com/office/powerpoint/2010/main" val="2816162945"/>
       </p:ext>
     </p:extLst>
   </p:cSld>
@@ -5029,11 +5029,7 @@
           <a:p>
             <a:r>
               <a:rPr lang="fr-FR" dirty="0" smtClean="0"/>
-              <a:t>Afin </a:t>
-            </a:r>
-            <a:r>
-              <a:rPr lang="fr-FR" dirty="0" smtClean="0"/>
-              <a:t>de prendre en compte le réalisateur, nous créons une variable « </a:t>
+              <a:t>Afin de prendre en compte le réalisateur, nous créons une variable « </a:t>
             </a:r>
             <a:r>
               <a:rPr lang="fr-FR" dirty="0" err="1" smtClean="0"/>
@@ -5041,9 +5037,16 @@
             </a:r>
             <a:r>
               <a:rPr lang="fr-FR" dirty="0" smtClean="0"/>
-              <a:t> » égal au nombre de films présents réalisés par ce directeur</a:t>
-            </a:r>
-            <a:endParaRPr lang="fr-FR" dirty="0" smtClean="0"/>
+              <a:t> » égal au nombre de </a:t>
+            </a:r>
+            <a:r>
+              <a:rPr lang="fr-FR" dirty="0" smtClean="0"/>
+              <a:t>films </a:t>
+            </a:r>
+            <a:r>
+              <a:rPr lang="fr-FR" dirty="0" smtClean="0"/>
+              <a:t>réalisés par ce directeur</a:t>
+            </a:r>
           </a:p>
         </p:txBody>
       </p:sp>
@@ -5225,7 +5228,7 @@
     </p:spTree>
     <p:extLst>
       <p:ext uri="{BB962C8B-B14F-4D97-AF65-F5344CB8AC3E}">
-        <p14:creationId xmlns:p14="http://schemas.microsoft.com/office/powerpoint/2010/main" xmlns="" val="2938571504"/>
+        <p14:creationId xmlns:p14="http://schemas.microsoft.com/office/powerpoint/2010/main" val="2938571504"/>
       </p:ext>
     </p:extLst>
   </p:cSld>
@@ -5274,7 +5277,7 @@
         </p:nvSpPr>
         <p:spPr>
           <a:xfrm>
-            <a:off x="2915816" y="3861048"/>
+            <a:off x="2843808" y="4437112"/>
             <a:ext cx="7848872" cy="62880"/>
           </a:xfrm>
         </p:spPr>
@@ -5287,8 +5290,22 @@
               <a:t>4. </a:t>
             </a:r>
             <a:r>
+              <a:rPr lang="fr-FR" sz="3200" dirty="0" smtClean="0"/>
+              <a:t>Modélisation</a:t>
+            </a:r>
+            <a:br>
+              <a:rPr lang="fr-FR" sz="3200" dirty="0" smtClean="0"/>
+            </a:br>
+            <a:r>
+              <a:rPr lang="fr-FR" sz="3200" dirty="0" smtClean="0"/>
+              <a:t/>
+            </a:r>
+            <a:br>
+              <a:rPr lang="fr-FR" sz="3200" dirty="0" smtClean="0"/>
+            </a:br>
+            <a:r>
               <a:rPr lang="fr-FR" sz="3200" dirty="0"/>
-              <a:t>Modélisation</a:t>
+              <a:t/>
             </a:r>
             <a:br>
               <a:rPr lang="fr-FR" sz="3200" dirty="0"/>
@@ -5297,10 +5314,65 @@
           </a:p>
         </p:txBody>
       </p:sp>
+      <p:sp>
+        <p:nvSpPr>
+          <p:cNvPr id="3" name="ZoneTexte 2"/>
+          <p:cNvSpPr txBox="1"/>
+          <p:nvPr/>
+        </p:nvSpPr>
+        <p:spPr>
+          <a:xfrm>
+            <a:off x="3275856" y="3329409"/>
+            <a:ext cx="3018775" cy="1384995"/>
+          </a:xfrm>
+          <a:prstGeom prst="rect">
+            <a:avLst/>
+          </a:prstGeom>
+          <a:noFill/>
+        </p:spPr>
+        <p:txBody>
+          <a:bodyPr wrap="none" rtlCol="0">
+            <a:spAutoFit/>
+          </a:bodyPr>
+          <a:lstStyle/>
+          <a:p>
+            <a:pPr marL="457200" indent="-457200">
+              <a:buFont typeface="Arial" pitchFamily="34" charset="0"/>
+              <a:buChar char="•"/>
+            </a:pPr>
+            <a:r>
+              <a:rPr lang="fr-FR" sz="2800" dirty="0" smtClean="0"/>
+              <a:t>PCA</a:t>
+            </a:r>
+          </a:p>
+          <a:p>
+            <a:pPr marL="457200" indent="-457200">
+              <a:buFont typeface="Arial" pitchFamily="34" charset="0"/>
+              <a:buChar char="•"/>
+            </a:pPr>
+            <a:r>
+              <a:rPr lang="fr-FR" sz="2800" dirty="0" err="1" smtClean="0"/>
+              <a:t>Kmeans</a:t>
+            </a:r>
+            <a:endParaRPr lang="fr-FR" sz="2800" dirty="0" smtClean="0"/>
+          </a:p>
+          <a:p>
+            <a:pPr marL="457200" indent="-457200">
+              <a:buFont typeface="Arial" pitchFamily="34" charset="0"/>
+              <a:buChar char="•"/>
+            </a:pPr>
+            <a:r>
+              <a:rPr lang="fr-FR" sz="2800" dirty="0" err="1" smtClean="0"/>
+              <a:t>NearestNeighbors</a:t>
+            </a:r>
+            <a:endParaRPr lang="fr-FR" sz="2800" dirty="0"/>
+          </a:p>
+        </p:txBody>
+      </p:sp>
     </p:spTree>
     <p:extLst>
       <p:ext uri="{BB962C8B-B14F-4D97-AF65-F5344CB8AC3E}">
-        <p14:creationId xmlns:p14="http://schemas.microsoft.com/office/powerpoint/2010/main" xmlns="" val="3261211585"/>
+        <p14:creationId xmlns:p14="http://schemas.microsoft.com/office/powerpoint/2010/main" val="3261211585"/>
       </p:ext>
     </p:extLst>
   </p:cSld>
@@ -5376,7 +5448,7 @@
           <a:blip r:embed="rId5" cstate="print">
             <a:extLst>
               <a:ext uri="{28A0092B-C50C-407E-A947-70E740481C1C}">
-                <a14:useLocalDpi xmlns:a14="http://schemas.microsoft.com/office/drawing/2010/main" xmlns="" val="0"/>
+                <a14:useLocalDpi xmlns:a14="http://schemas.microsoft.com/office/drawing/2010/main" val="0"/>
               </a:ext>
             </a:extLst>
           </a:blip>
@@ -5400,14 +5472,14 @@
           <a:effectLst/>
           <a:extLst>
             <a:ext uri="{909E8E84-426E-40DD-AFC4-6F175D3DCCD1}">
-              <a14:hiddenFill xmlns:a14="http://schemas.microsoft.com/office/drawing/2010/main" xmlns="">
+              <a14:hiddenFill xmlns:a14="http://schemas.microsoft.com/office/drawing/2010/main">
                 <a:solidFill>
                   <a:schemeClr val="accent1"/>
                 </a:solidFill>
               </a14:hiddenFill>
             </a:ext>
             <a:ext uri="{91240B29-F687-4F45-9708-019B960494DF}">
-              <a14:hiddenLine xmlns:a14="http://schemas.microsoft.com/office/drawing/2010/main" xmlns="" w="9525">
+              <a14:hiddenLine xmlns:a14="http://schemas.microsoft.com/office/drawing/2010/main" w="9525">
                 <a:solidFill>
                   <a:schemeClr val="tx1"/>
                 </a:solidFill>
@@ -5417,7 +5489,7 @@
               </a14:hiddenLine>
             </a:ext>
             <a:ext uri="{AF507438-7753-43E0-B8FC-AC1667EBCBE1}">
-              <a14:hiddenEffects xmlns:a14="http://schemas.microsoft.com/office/drawing/2010/main" xmlns="">
+              <a14:hiddenEffects xmlns:a14="http://schemas.microsoft.com/office/drawing/2010/main">
                 <a:effectLst>
                   <a:outerShdw dist="35921" dir="2700000" algn="ctr" rotWithShape="0">
                     <a:schemeClr val="bg2"/>
@@ -5497,7 +5569,7 @@
     </p:spTree>
     <p:extLst>
       <p:ext uri="{BB962C8B-B14F-4D97-AF65-F5344CB8AC3E}">
-        <p14:creationId xmlns:p14="http://schemas.microsoft.com/office/powerpoint/2010/main" xmlns="" val="1609523828"/>
+        <p14:creationId xmlns:p14="http://schemas.microsoft.com/office/powerpoint/2010/main" val="1609523828"/>
       </p:ext>
     </p:extLst>
   </p:cSld>
@@ -5570,7 +5642,12 @@
             </p:custDataLst>
           </p:nvPr>
         </p:nvSpPr>
-        <p:spPr/>
+        <p:spPr>
+          <a:xfrm>
+            <a:off x="1979712" y="1988840"/>
+            <a:ext cx="6482680" cy="3556992"/>
+          </a:xfrm>
+        </p:spPr>
         <p:txBody>
           <a:bodyPr>
             <a:normAutofit/>
@@ -5649,7 +5726,7 @@
     </p:spTree>
     <p:extLst>
       <p:ext uri="{BB962C8B-B14F-4D97-AF65-F5344CB8AC3E}">
-        <p14:creationId xmlns:p14="http://schemas.microsoft.com/office/powerpoint/2010/main" xmlns="" val="3169358650"/>
+        <p14:creationId xmlns:p14="http://schemas.microsoft.com/office/powerpoint/2010/main" val="3169358650"/>
       </p:ext>
     </p:extLst>
   </p:cSld>
@@ -5725,7 +5802,7 @@
           <a:blip r:embed="rId5" cstate="print">
             <a:extLst>
               <a:ext uri="{28A0092B-C50C-407E-A947-70E740481C1C}">
-                <a14:useLocalDpi xmlns:a14="http://schemas.microsoft.com/office/drawing/2010/main" xmlns="" val="0"/>
+                <a14:useLocalDpi xmlns:a14="http://schemas.microsoft.com/office/drawing/2010/main" val="0"/>
               </a:ext>
             </a:extLst>
           </a:blip>
@@ -5749,14 +5826,14 @@
           <a:effectLst/>
           <a:extLst>
             <a:ext uri="{909E8E84-426E-40DD-AFC4-6F175D3DCCD1}">
-              <a14:hiddenFill xmlns:a14="http://schemas.microsoft.com/office/drawing/2010/main" xmlns="">
+              <a14:hiddenFill xmlns:a14="http://schemas.microsoft.com/office/drawing/2010/main">
                 <a:solidFill>
                   <a:schemeClr val="accent1"/>
                 </a:solidFill>
               </a14:hiddenFill>
             </a:ext>
             <a:ext uri="{91240B29-F687-4F45-9708-019B960494DF}">
-              <a14:hiddenLine xmlns:a14="http://schemas.microsoft.com/office/drawing/2010/main" xmlns="" w="9525">
+              <a14:hiddenLine xmlns:a14="http://schemas.microsoft.com/office/drawing/2010/main" w="9525">
                 <a:solidFill>
                   <a:schemeClr val="tx1"/>
                 </a:solidFill>
@@ -5766,7 +5843,7 @@
               </a14:hiddenLine>
             </a:ext>
             <a:ext uri="{AF507438-7753-43E0-B8FC-AC1667EBCBE1}">
-              <a14:hiddenEffects xmlns:a14="http://schemas.microsoft.com/office/drawing/2010/main" xmlns="">
+              <a14:hiddenEffects xmlns:a14="http://schemas.microsoft.com/office/drawing/2010/main">
                 <a:effectLst>
                   <a:outerShdw dist="35921" dir="2700000" algn="ctr" rotWithShape="0">
                     <a:schemeClr val="bg2"/>
@@ -5793,7 +5870,7 @@
           <a:blip r:embed="rId6" cstate="print">
             <a:extLst>
               <a:ext uri="{28A0092B-C50C-407E-A947-70E740481C1C}">
-                <a14:useLocalDpi xmlns:a14="http://schemas.microsoft.com/office/drawing/2010/main" xmlns="" val="0"/>
+                <a14:useLocalDpi xmlns:a14="http://schemas.microsoft.com/office/drawing/2010/main" val="0"/>
               </a:ext>
             </a:extLst>
           </a:blip>
@@ -5817,14 +5894,14 @@
           <a:effectLst/>
           <a:extLst>
             <a:ext uri="{909E8E84-426E-40DD-AFC4-6F175D3DCCD1}">
-              <a14:hiddenFill xmlns:a14="http://schemas.microsoft.com/office/drawing/2010/main" xmlns="">
+              <a14:hiddenFill xmlns:a14="http://schemas.microsoft.com/office/drawing/2010/main">
                 <a:solidFill>
                   <a:schemeClr val="accent1"/>
                 </a:solidFill>
               </a14:hiddenFill>
             </a:ext>
             <a:ext uri="{91240B29-F687-4F45-9708-019B960494DF}">
-              <a14:hiddenLine xmlns:a14="http://schemas.microsoft.com/office/drawing/2010/main" xmlns="" w="9525">
+              <a14:hiddenLine xmlns:a14="http://schemas.microsoft.com/office/drawing/2010/main" w="9525">
                 <a:solidFill>
                   <a:schemeClr val="tx1"/>
                 </a:solidFill>
@@ -5834,7 +5911,7 @@
               </a14:hiddenLine>
             </a:ext>
             <a:ext uri="{AF507438-7753-43E0-B8FC-AC1667EBCBE1}">
-              <a14:hiddenEffects xmlns:a14="http://schemas.microsoft.com/office/drawing/2010/main" xmlns="">
+              <a14:hiddenEffects xmlns:a14="http://schemas.microsoft.com/office/drawing/2010/main">
                 <a:effectLst>
                   <a:outerShdw dist="35921" dir="2700000" algn="ctr" rotWithShape="0">
                     <a:schemeClr val="bg2"/>
@@ -5848,7 +5925,7 @@
     </p:spTree>
     <p:extLst>
       <p:ext uri="{BB962C8B-B14F-4D97-AF65-F5344CB8AC3E}">
-        <p14:creationId xmlns:p14="http://schemas.microsoft.com/office/powerpoint/2010/main" xmlns="" val="180601871"/>
+        <p14:creationId xmlns:p14="http://schemas.microsoft.com/office/powerpoint/2010/main" val="180601871"/>
       </p:ext>
     </p:extLst>
   </p:cSld>
@@ -5929,7 +6006,7 @@
           <a:blip r:embed="rId5" cstate="print">
             <a:extLst>
               <a:ext uri="{28A0092B-C50C-407E-A947-70E740481C1C}">
-                <a14:useLocalDpi xmlns:a14="http://schemas.microsoft.com/office/drawing/2010/main" xmlns="" val="0"/>
+                <a14:useLocalDpi xmlns:a14="http://schemas.microsoft.com/office/drawing/2010/main" val="0"/>
               </a:ext>
             </a:extLst>
           </a:blip>
@@ -5953,14 +6030,14 @@
           <a:effectLst/>
           <a:extLst>
             <a:ext uri="{909E8E84-426E-40DD-AFC4-6F175D3DCCD1}">
-              <a14:hiddenFill xmlns:a14="http://schemas.microsoft.com/office/drawing/2010/main" xmlns="">
+              <a14:hiddenFill xmlns:a14="http://schemas.microsoft.com/office/drawing/2010/main">
                 <a:solidFill>
                   <a:schemeClr val="accent1"/>
                 </a:solidFill>
               </a14:hiddenFill>
             </a:ext>
             <a:ext uri="{91240B29-F687-4F45-9708-019B960494DF}">
-              <a14:hiddenLine xmlns:a14="http://schemas.microsoft.com/office/drawing/2010/main" xmlns="" w="9525">
+              <a14:hiddenLine xmlns:a14="http://schemas.microsoft.com/office/drawing/2010/main" w="9525">
                 <a:solidFill>
                   <a:schemeClr val="tx1"/>
                 </a:solidFill>
@@ -5970,7 +6047,7 @@
               </a14:hiddenLine>
             </a:ext>
             <a:ext uri="{AF507438-7753-43E0-B8FC-AC1667EBCBE1}">
-              <a14:hiddenEffects xmlns:a14="http://schemas.microsoft.com/office/drawing/2010/main" xmlns="">
+              <a14:hiddenEffects xmlns:a14="http://schemas.microsoft.com/office/drawing/2010/main">
                 <a:effectLst>
                   <a:outerShdw dist="35921" dir="2700000" algn="ctr" rotWithShape="0">
                     <a:schemeClr val="bg2"/>
@@ -6071,7 +6148,7 @@
     </p:spTree>
     <p:extLst>
       <p:ext uri="{BB962C8B-B14F-4D97-AF65-F5344CB8AC3E}">
-        <p14:creationId xmlns:p14="http://schemas.microsoft.com/office/powerpoint/2010/main" xmlns="" val="3434015581"/>
+        <p14:creationId xmlns:p14="http://schemas.microsoft.com/office/powerpoint/2010/main" val="3434015581"/>
       </p:ext>
     </p:extLst>
   </p:cSld>
@@ -6156,7 +6233,7 @@
           <a:blip r:embed="rId5" cstate="print">
             <a:extLst>
               <a:ext uri="{28A0092B-C50C-407E-A947-70E740481C1C}">
-                <a14:useLocalDpi xmlns:a14="http://schemas.microsoft.com/office/drawing/2010/main" xmlns="" val="0"/>
+                <a14:useLocalDpi xmlns:a14="http://schemas.microsoft.com/office/drawing/2010/main" val="0"/>
               </a:ext>
             </a:extLst>
           </a:blip>
@@ -6180,14 +6257,14 @@
           <a:effectLst/>
           <a:extLst>
             <a:ext uri="{909E8E84-426E-40DD-AFC4-6F175D3DCCD1}">
-              <a14:hiddenFill xmlns:a14="http://schemas.microsoft.com/office/drawing/2010/main" xmlns="">
+              <a14:hiddenFill xmlns:a14="http://schemas.microsoft.com/office/drawing/2010/main">
                 <a:solidFill>
                   <a:schemeClr val="accent1"/>
                 </a:solidFill>
               </a14:hiddenFill>
             </a:ext>
             <a:ext uri="{91240B29-F687-4F45-9708-019B960494DF}">
-              <a14:hiddenLine xmlns:a14="http://schemas.microsoft.com/office/drawing/2010/main" xmlns="" w="9525">
+              <a14:hiddenLine xmlns:a14="http://schemas.microsoft.com/office/drawing/2010/main" w="9525">
                 <a:solidFill>
                   <a:schemeClr val="tx1"/>
                 </a:solidFill>
@@ -6197,7 +6274,7 @@
               </a14:hiddenLine>
             </a:ext>
             <a:ext uri="{AF507438-7753-43E0-B8FC-AC1667EBCBE1}">
-              <a14:hiddenEffects xmlns:a14="http://schemas.microsoft.com/office/drawing/2010/main" xmlns="">
+              <a14:hiddenEffects xmlns:a14="http://schemas.microsoft.com/office/drawing/2010/main">
                 <a:effectLst>
                   <a:outerShdw dist="35921" dir="2700000" algn="ctr" rotWithShape="0">
                     <a:schemeClr val="bg2"/>
@@ -6259,7 +6336,7 @@
     </p:spTree>
     <p:extLst>
       <p:ext uri="{BB962C8B-B14F-4D97-AF65-F5344CB8AC3E}">
-        <p14:creationId xmlns:p14="http://schemas.microsoft.com/office/powerpoint/2010/main" xmlns="" val="4254911022"/>
+        <p14:creationId xmlns:p14="http://schemas.microsoft.com/office/powerpoint/2010/main" val="4254911022"/>
       </p:ext>
     </p:extLst>
   </p:cSld>
@@ -6375,15 +6452,20 @@
             </a:pPr>
             <a:r>
               <a:rPr lang="fr-FR" sz="2400" dirty="0" smtClean="0"/>
-              <a:t>Classement par score IMBD</a:t>
-            </a:r>
+              <a:t>Classement par score </a:t>
+            </a:r>
+            <a:r>
+              <a:rPr lang="fr-FR" sz="2400" dirty="0" smtClean="0"/>
+              <a:t>IMDB</a:t>
+            </a:r>
+            <a:endParaRPr lang="fr-FR" sz="2400" dirty="0" smtClean="0"/>
           </a:p>
         </p:txBody>
       </p:sp>
     </p:spTree>
     <p:extLst>
       <p:ext uri="{BB962C8B-B14F-4D97-AF65-F5344CB8AC3E}">
-        <p14:creationId xmlns:p14="http://schemas.microsoft.com/office/powerpoint/2010/main" xmlns="" val="299747357"/>
+        <p14:creationId xmlns:p14="http://schemas.microsoft.com/office/powerpoint/2010/main" val="299747357"/>
       </p:ext>
     </p:extLst>
   </p:cSld>
@@ -6454,21 +6536,17 @@
       </p:sp>
       <p:pic>
         <p:nvPicPr>
-          <p:cNvPr id="10242" name="Picture 2"/>
+          <p:cNvPr id="1026" name="Picture 2"/>
           <p:cNvPicPr>
             <a:picLocks noChangeAspect="1" noChangeArrowheads="1"/>
           </p:cNvPicPr>
-          <p:nvPr>
-            <p:custDataLst>
-              <p:tags r:id="rId2"/>
-            </p:custDataLst>
-          </p:nvPr>
+          <p:nvPr/>
         </p:nvPicPr>
         <p:blipFill>
-          <a:blip r:embed="rId4" cstate="print">
+          <a:blip r:embed="rId3">
             <a:extLst>
               <a:ext uri="{28A0092B-C50C-407E-A947-70E740481C1C}">
-                <a14:useLocalDpi xmlns:a14="http://schemas.microsoft.com/office/drawing/2010/main" xmlns="" val="0"/>
+                <a14:useLocalDpi xmlns:a14="http://schemas.microsoft.com/office/drawing/2010/main" val="0"/>
               </a:ext>
             </a:extLst>
           </a:blip>
@@ -6479,8 +6557,8 @@
         </p:blipFill>
         <p:spPr bwMode="auto">
           <a:xfrm>
-            <a:off x="447749" y="1556792"/>
-            <a:ext cx="8385175" cy="3697287"/>
+            <a:off x="369888" y="1570038"/>
+            <a:ext cx="8404225" cy="3716337"/>
           </a:xfrm>
           <a:prstGeom prst="rect">
             <a:avLst/>
@@ -6492,14 +6570,14 @@
           <a:effectLst/>
           <a:extLst>
             <a:ext uri="{909E8E84-426E-40DD-AFC4-6F175D3DCCD1}">
-              <a14:hiddenFill xmlns:a14="http://schemas.microsoft.com/office/drawing/2010/main" xmlns="">
+              <a14:hiddenFill xmlns:a14="http://schemas.microsoft.com/office/drawing/2010/main">
                 <a:solidFill>
                   <a:schemeClr val="accent1"/>
                 </a:solidFill>
               </a14:hiddenFill>
             </a:ext>
             <a:ext uri="{91240B29-F687-4F45-9708-019B960494DF}">
-              <a14:hiddenLine xmlns:a14="http://schemas.microsoft.com/office/drawing/2010/main" xmlns="" w="9525">
+              <a14:hiddenLine xmlns:a14="http://schemas.microsoft.com/office/drawing/2010/main" w="9525">
                 <a:solidFill>
                   <a:schemeClr val="tx1"/>
                 </a:solidFill>
@@ -6509,7 +6587,7 @@
               </a14:hiddenLine>
             </a:ext>
             <a:ext uri="{AF507438-7753-43E0-B8FC-AC1667EBCBE1}">
-              <a14:hiddenEffects xmlns:a14="http://schemas.microsoft.com/office/drawing/2010/main" xmlns="">
+              <a14:hiddenEffects xmlns:a14="http://schemas.microsoft.com/office/drawing/2010/main">
                 <a:effectLst>
                   <a:outerShdw dist="35921" dir="2700000" algn="ctr" rotWithShape="0">
                     <a:schemeClr val="bg2"/>
@@ -6523,7 +6601,7 @@
     </p:spTree>
     <p:extLst>
       <p:ext uri="{BB962C8B-B14F-4D97-AF65-F5344CB8AC3E}">
-        <p14:creationId xmlns:p14="http://schemas.microsoft.com/office/powerpoint/2010/main" xmlns="" val="2536859922"/>
+        <p14:creationId xmlns:p14="http://schemas.microsoft.com/office/powerpoint/2010/main" val="2536859922"/>
       </p:ext>
     </p:extLst>
   </p:cSld>
@@ -6598,7 +6676,7 @@
     </p:spTree>
     <p:extLst>
       <p:ext uri="{BB962C8B-B14F-4D97-AF65-F5344CB8AC3E}">
-        <p14:creationId xmlns:p14="http://schemas.microsoft.com/office/powerpoint/2010/main" xmlns="" val="738188909"/>
+        <p14:creationId xmlns:p14="http://schemas.microsoft.com/office/powerpoint/2010/main" val="738188909"/>
       </p:ext>
     </p:extLst>
   </p:cSld>
@@ -6715,19 +6793,19 @@
             </a:pPr>
             <a:r>
               <a:rPr lang="fr-FR" dirty="0" smtClean="0">
-                <a:hlinkClick r:id="rId5"/>
+                <a:hlinkClick r:id="rId4"/>
               </a:rPr>
               <a:t>https</a:t>
             </a:r>
             <a:r>
               <a:rPr lang="fr-FR" dirty="0">
-                <a:hlinkClick r:id="rId5"/>
+                <a:hlinkClick r:id="rId4"/>
               </a:rPr>
               <a:t>://</a:t>
             </a:r>
             <a:r>
               <a:rPr lang="fr-FR" dirty="0" smtClean="0">
-                <a:hlinkClick r:id="rId5"/>
+                <a:hlinkClick r:id="rId4"/>
               </a:rPr>
               <a:t>www.pythonanywhere.com</a:t>
             </a:r>
@@ -6747,15 +6825,7 @@
             </a:pPr>
             <a:r>
               <a:rPr lang="fr-FR" dirty="0" smtClean="0"/>
-              <a:t>http://umercia.pythonanywhere.com</a:t>
-            </a:r>
-            <a:r>
-              <a:rPr lang="fr-FR" dirty="0" smtClean="0"/>
-              <a:t>/recommend</a:t>
-            </a:r>
-            <a:r>
-              <a:rPr lang="fr-FR" dirty="0" smtClean="0"/>
-              <a:t>/{movie_title}</a:t>
+              <a:t>http://umercia.pythonanywhere.com/recommend/{movie_title}</a:t>
             </a:r>
             <a:endParaRPr lang="fr-FR" dirty="0"/>
           </a:p>
@@ -6763,21 +6833,17 @@
       </p:sp>
       <p:pic>
         <p:nvPicPr>
-          <p:cNvPr id="11268" name="Picture 4"/>
+          <p:cNvPr id="2050" name="Picture 2"/>
           <p:cNvPicPr>
             <a:picLocks noChangeAspect="1" noChangeArrowheads="1"/>
           </p:cNvPicPr>
-          <p:nvPr>
-            <p:custDataLst>
-              <p:tags r:id="rId3"/>
-            </p:custDataLst>
-          </p:nvPr>
+          <p:nvPr/>
         </p:nvPicPr>
         <p:blipFill>
-          <a:blip r:embed="rId6" cstate="print">
+          <a:blip r:embed="rId5">
             <a:extLst>
               <a:ext uri="{28A0092B-C50C-407E-A947-70E740481C1C}">
-                <a14:useLocalDpi xmlns:a14="http://schemas.microsoft.com/office/drawing/2010/main" xmlns="" val="0"/>
+                <a14:useLocalDpi xmlns:a14="http://schemas.microsoft.com/office/drawing/2010/main" val="0"/>
               </a:ext>
             </a:extLst>
           </a:blip>
@@ -6788,8 +6854,8 @@
         </p:blipFill>
         <p:spPr bwMode="auto">
           <a:xfrm>
-            <a:off x="729283" y="3573016"/>
-            <a:ext cx="7632848" cy="1512592"/>
+            <a:off x="611560" y="3861048"/>
+            <a:ext cx="7920880" cy="1156475"/>
           </a:xfrm>
           <a:prstGeom prst="rect">
             <a:avLst/>
@@ -6801,14 +6867,14 @@
           <a:effectLst/>
           <a:extLst>
             <a:ext uri="{909E8E84-426E-40DD-AFC4-6F175D3DCCD1}">
-              <a14:hiddenFill xmlns:a14="http://schemas.microsoft.com/office/drawing/2010/main" xmlns="">
+              <a14:hiddenFill xmlns:a14="http://schemas.microsoft.com/office/drawing/2010/main">
                 <a:solidFill>
                   <a:schemeClr val="accent1"/>
                 </a:solidFill>
               </a14:hiddenFill>
             </a:ext>
             <a:ext uri="{91240B29-F687-4F45-9708-019B960494DF}">
-              <a14:hiddenLine xmlns:a14="http://schemas.microsoft.com/office/drawing/2010/main" xmlns="" w="9525">
+              <a14:hiddenLine xmlns:a14="http://schemas.microsoft.com/office/drawing/2010/main" w="9525">
                 <a:solidFill>
                   <a:schemeClr val="tx1"/>
                 </a:solidFill>
@@ -6818,7 +6884,7 @@
               </a14:hiddenLine>
             </a:ext>
             <a:ext uri="{AF507438-7753-43E0-B8FC-AC1667EBCBE1}">
-              <a14:hiddenEffects xmlns:a14="http://schemas.microsoft.com/office/drawing/2010/main" xmlns="">
+              <a14:hiddenEffects xmlns:a14="http://schemas.microsoft.com/office/drawing/2010/main">
                 <a:effectLst>
                   <a:outerShdw dist="35921" dir="2700000" algn="ctr" rotWithShape="0">
                     <a:schemeClr val="bg2"/>
@@ -6832,7 +6898,7 @@
     </p:spTree>
     <p:extLst>
       <p:ext uri="{BB962C8B-B14F-4D97-AF65-F5344CB8AC3E}">
-        <p14:creationId xmlns:p14="http://schemas.microsoft.com/office/powerpoint/2010/main" xmlns="" val="2841751922"/>
+        <p14:creationId xmlns:p14="http://schemas.microsoft.com/office/powerpoint/2010/main" val="2841751922"/>
       </p:ext>
     </p:extLst>
   </p:cSld>
@@ -6907,7 +6973,7 @@
     </p:spTree>
     <p:extLst>
       <p:ext uri="{BB962C8B-B14F-4D97-AF65-F5344CB8AC3E}">
-        <p14:creationId xmlns:p14="http://schemas.microsoft.com/office/powerpoint/2010/main" xmlns="" val="240067617"/>
+        <p14:creationId xmlns:p14="http://schemas.microsoft.com/office/powerpoint/2010/main" val="240067617"/>
       </p:ext>
     </p:extLst>
   </p:cSld>
@@ -6980,7 +7046,12 @@
             </p:custDataLst>
           </p:nvPr>
         </p:nvSpPr>
-        <p:spPr/>
+        <p:spPr>
+          <a:xfrm>
+            <a:off x="609600" y="1618456"/>
+            <a:ext cx="7924800" cy="4114800"/>
+          </a:xfrm>
+        </p:spPr>
         <p:txBody>
           <a:bodyPr/>
           <a:lstStyle/>
@@ -7018,7 +7089,15 @@
             </a:r>
             <a:r>
               <a:rPr lang="fr-FR" dirty="0"/>
-              <a:t> vous devrez élaborer une API capable de retourner 5 recommandations de films similaires et intéressants pour le visiteur. Ceci à partir d’une requête d’un nom de film (ou un id</a:t>
+              <a:t> vous devrez élaborer une API capable de retourner 5 </a:t>
+            </a:r>
+            <a:r>
+              <a:rPr lang="fr-FR" b="1" dirty="0"/>
+              <a:t>recommandations</a:t>
+            </a:r>
+            <a:r>
+              <a:rPr lang="fr-FR" dirty="0"/>
+              <a:t> de films similaires et intéressants pour le visiteur. Ceci à partir d’une requête d’un nom de film (ou un id</a:t>
             </a:r>
             <a:r>
               <a:rPr lang="fr-FR" dirty="0" smtClean="0"/>
@@ -7064,7 +7143,7 @@
     </p:spTree>
     <p:extLst>
       <p:ext uri="{BB962C8B-B14F-4D97-AF65-F5344CB8AC3E}">
-        <p14:creationId xmlns:p14="http://schemas.microsoft.com/office/powerpoint/2010/main" xmlns="" val="2609009839"/>
+        <p14:creationId xmlns:p14="http://schemas.microsoft.com/office/powerpoint/2010/main" val="2609009839"/>
       </p:ext>
     </p:extLst>
   </p:cSld>
@@ -7098,41 +7177,6 @@
           <a:chExt cx="0" cy="0"/>
         </a:xfrm>
       </p:grpSpPr>
-      <p:sp>
-        <p:nvSpPr>
-          <p:cNvPr id="2" name="Titre 1"/>
-          <p:cNvSpPr>
-            <a:spLocks noGrp="1"/>
-          </p:cNvSpPr>
-          <p:nvPr>
-            <p:ph type="title"/>
-            <p:custDataLst>
-              <p:tags r:id="rId1"/>
-            </p:custDataLst>
-          </p:nvPr>
-        </p:nvSpPr>
-        <p:spPr>
-          <a:xfrm>
-            <a:off x="609600" y="274638"/>
-            <a:ext cx="7924800" cy="562074"/>
-          </a:xfrm>
-        </p:spPr>
-        <p:txBody>
-          <a:bodyPr/>
-          <a:lstStyle/>
-          <a:p>
-            <a:r>
-              <a:rPr lang="fr-FR" dirty="0" smtClean="0"/>
-              <a:t>Input data: </a:t>
-            </a:r>
-            <a:r>
-              <a:rPr lang="fr-FR" dirty="0" err="1" smtClean="0"/>
-              <a:t>IMDb</a:t>
-            </a:r>
-            <a:endParaRPr lang="fr-FR" dirty="0"/>
-          </a:p>
-        </p:txBody>
-      </p:sp>
       <p:pic>
         <p:nvPicPr>
           <p:cNvPr id="1026" name="Picture 2"/>
@@ -7142,15 +7186,15 @@
           <p:nvPr>
             <p:ph sz="quarter" idx="13"/>
             <p:custDataLst>
-              <p:tags r:id="rId2"/>
+              <p:tags r:id="rId1"/>
             </p:custDataLst>
           </p:nvPr>
         </p:nvPicPr>
         <p:blipFill>
-          <a:blip r:embed="rId4" cstate="print">
+          <a:blip r:embed="rId3" cstate="print">
             <a:extLst>
               <a:ext uri="{28A0092B-C50C-407E-A947-70E740481C1C}">
-                <a14:useLocalDpi xmlns:a14="http://schemas.microsoft.com/office/drawing/2010/main" xmlns="" val="0"/>
+                <a14:useLocalDpi xmlns:a14="http://schemas.microsoft.com/office/drawing/2010/main" val="0"/>
               </a:ext>
             </a:extLst>
           </a:blip>
@@ -7161,8 +7205,8 @@
         </p:blipFill>
         <p:spPr bwMode="auto">
           <a:xfrm>
-            <a:off x="1691680" y="908720"/>
-            <a:ext cx="5613317" cy="4780054"/>
+            <a:off x="1041419" y="1844824"/>
+            <a:ext cx="7334429" cy="4704327"/>
           </a:xfrm>
           <a:prstGeom prst="rect">
             <a:avLst/>
@@ -7174,14 +7218,14 @@
           <a:effectLst/>
           <a:extLst>
             <a:ext uri="{909E8E84-426E-40DD-AFC4-6F175D3DCCD1}">
-              <a14:hiddenFill xmlns:a14="http://schemas.microsoft.com/office/drawing/2010/main" xmlns="">
+              <a14:hiddenFill xmlns:a14="http://schemas.microsoft.com/office/drawing/2010/main">
                 <a:solidFill>
                   <a:schemeClr val="accent1"/>
                 </a:solidFill>
               </a14:hiddenFill>
             </a:ext>
             <a:ext uri="{91240B29-F687-4F45-9708-019B960494DF}">
-              <a14:hiddenLine xmlns:a14="http://schemas.microsoft.com/office/drawing/2010/main" xmlns="" w="9525">
+              <a14:hiddenLine xmlns:a14="http://schemas.microsoft.com/office/drawing/2010/main" w="9525">
                 <a:solidFill>
                   <a:schemeClr val="tx1"/>
                 </a:solidFill>
@@ -7191,7 +7235,7 @@
               </a14:hiddenLine>
             </a:ext>
             <a:ext uri="{AF507438-7753-43E0-B8FC-AC1667EBCBE1}">
-              <a14:hiddenEffects xmlns:a14="http://schemas.microsoft.com/office/drawing/2010/main" xmlns="">
+              <a14:hiddenEffects xmlns:a14="http://schemas.microsoft.com/office/drawing/2010/main">
                 <a:effectLst>
                   <a:outerShdw dist="35921" dir="2700000" algn="ctr" rotWithShape="0">
                     <a:schemeClr val="bg2"/>
@@ -7202,10 +7246,144 @@
           </a:extLst>
         </p:spPr>
       </p:pic>
+      <p:sp>
+        <p:nvSpPr>
+          <p:cNvPr id="3" name="ZoneTexte 2"/>
+          <p:cNvSpPr txBox="1"/>
+          <p:nvPr/>
+        </p:nvSpPr>
+        <p:spPr>
+          <a:xfrm>
+            <a:off x="1031032" y="548680"/>
+            <a:ext cx="7344816" cy="1354217"/>
+          </a:xfrm>
+          <a:prstGeom prst="rect">
+            <a:avLst/>
+          </a:prstGeom>
+          <a:noFill/>
+        </p:spPr>
+        <p:txBody>
+          <a:bodyPr wrap="square" rtlCol="0">
+            <a:spAutoFit/>
+          </a:bodyPr>
+          <a:lstStyle/>
+          <a:p>
+            <a:pPr marL="285750" indent="-285750">
+              <a:buFont typeface="Arial" pitchFamily="34" charset="0"/>
+              <a:buChar char="•"/>
+            </a:pPr>
+            <a:r>
+              <a:rPr lang="fr-FR" sz="2800" dirty="0" smtClean="0"/>
+              <a:t>IMBD</a:t>
+            </a:r>
+            <a:r>
+              <a:rPr lang="fr-FR" dirty="0"/>
+              <a:t> </a:t>
+            </a:r>
+            <a:r>
+              <a:rPr lang="fr-FR" dirty="0" smtClean="0"/>
+              <a:t>- Internet </a:t>
+            </a:r>
+            <a:r>
+              <a:rPr lang="fr-FR" dirty="0" err="1" smtClean="0"/>
+              <a:t>Movie</a:t>
+            </a:r>
+            <a:r>
+              <a:rPr lang="fr-FR" dirty="0" smtClean="0"/>
+              <a:t> Data Base:</a:t>
+            </a:r>
+          </a:p>
+          <a:p>
+            <a:pPr marL="742950" lvl="1" indent="-285750">
+              <a:buFont typeface="Arial" pitchFamily="34" charset="0"/>
+              <a:buChar char="•"/>
+            </a:pPr>
+            <a:r>
+              <a:rPr lang="fr-FR" dirty="0" smtClean="0"/>
+              <a:t>1990: </a:t>
+            </a:r>
+            <a:r>
+              <a:rPr lang="fr-FR" dirty="0"/>
+              <a:t> </a:t>
+            </a:r>
+            <a:r>
+              <a:rPr lang="fr-FR" dirty="0" smtClean="0"/>
+              <a:t>fondée par </a:t>
+            </a:r>
+            <a:r>
+              <a:rPr lang="fr-FR" dirty="0" smtClean="0">
+                <a:hlinkClick r:id="rId4" tooltip="Col Needham"/>
+              </a:rPr>
+              <a:t>Col </a:t>
+            </a:r>
+            <a:r>
+              <a:rPr lang="fr-FR" dirty="0" err="1" smtClean="0">
+                <a:hlinkClick r:id="rId4" tooltip="Col Needham"/>
+              </a:rPr>
+              <a:t>Needham</a:t>
+            </a:r>
+            <a:r>
+              <a:rPr lang="fr-FR" dirty="0" smtClean="0"/>
+              <a:t> sur les serveurs de l’université de Cardiff</a:t>
+            </a:r>
+            <a:endParaRPr lang="fr-FR" dirty="0"/>
+          </a:p>
+          <a:p>
+            <a:pPr marL="742950" lvl="1" indent="-285750">
+              <a:buFont typeface="Arial" pitchFamily="34" charset="0"/>
+              <a:buChar char="•"/>
+            </a:pPr>
+            <a:r>
+              <a:rPr lang="fr-FR" dirty="0" smtClean="0"/>
+              <a:t>1996:  Statut </a:t>
+            </a:r>
+            <a:r>
+              <a:rPr lang="fr-FR" dirty="0"/>
+              <a:t>d'entreprise </a:t>
+            </a:r>
+            <a:r>
+              <a:rPr lang="fr-FR" dirty="0" smtClean="0"/>
+              <a:t>de </a:t>
+            </a:r>
+            <a:r>
+              <a:rPr lang="fr-FR" dirty="0"/>
+              <a:t>manière à former l'Internet </a:t>
+            </a:r>
+            <a:r>
+              <a:rPr lang="fr-FR" dirty="0" err="1"/>
+              <a:t>Movie</a:t>
+            </a:r>
+            <a:r>
+              <a:rPr lang="fr-FR" dirty="0"/>
+              <a:t> </a:t>
+            </a:r>
+            <a:r>
+              <a:rPr lang="fr-FR" dirty="0" err="1"/>
+              <a:t>Database</a:t>
+            </a:r>
+            <a:r>
+              <a:rPr lang="fr-FR" dirty="0"/>
+              <a:t> Ltd</a:t>
+            </a:r>
+            <a:endParaRPr lang="fr-FR" dirty="0"/>
+          </a:p>
+          <a:p>
+            <a:pPr marL="742950" lvl="1" indent="-285750">
+              <a:buFont typeface="Arial" pitchFamily="34" charset="0"/>
+              <a:buChar char="•"/>
+            </a:pPr>
+            <a:r>
+              <a:rPr lang="fr-FR" dirty="0" smtClean="0"/>
+              <a:t>1998: l’entreprise est racheté par Amazon</a:t>
+            </a:r>
+            <a:endParaRPr lang="fr-FR" dirty="0"/>
+          </a:p>
+        </p:txBody>
+      </p:sp>
     </p:spTree>
     <p:extLst>
       <p:ext uri="{BB962C8B-B14F-4D97-AF65-F5344CB8AC3E}">
-        <p14:creationId xmlns:p14="http://schemas.microsoft.com/office/powerpoint/2010/main" xmlns="" val="4234735141"/>
+        <p14:creationId xmlns:p14="http://schemas.microsoft.com/office/powerpoint/2010/main" val="4234735141"/>
       </p:ext>
     </p:extLst>
   </p:cSld>
@@ -7288,7 +7466,7 @@
     </p:spTree>
     <p:extLst>
       <p:ext uri="{BB962C8B-B14F-4D97-AF65-F5344CB8AC3E}">
-        <p14:creationId xmlns:p14="http://schemas.microsoft.com/office/powerpoint/2010/main" xmlns="" val="1211952375"/>
+        <p14:creationId xmlns:p14="http://schemas.microsoft.com/office/powerpoint/2010/main" val="1211952375"/>
       </p:ext>
     </p:extLst>
   </p:cSld>
@@ -7338,7 +7516,7 @@
           <a:blip r:embed="rId5" cstate="print">
             <a:extLst>
               <a:ext uri="{28A0092B-C50C-407E-A947-70E740481C1C}">
-                <a14:useLocalDpi xmlns:a14="http://schemas.microsoft.com/office/drawing/2010/main" xmlns="" val="0"/>
+                <a14:useLocalDpi xmlns:a14="http://schemas.microsoft.com/office/drawing/2010/main" val="0"/>
               </a:ext>
             </a:extLst>
           </a:blip>
@@ -7362,14 +7540,14 @@
           <a:effectLst/>
           <a:extLst>
             <a:ext uri="{909E8E84-426E-40DD-AFC4-6F175D3DCCD1}">
-              <a14:hiddenFill xmlns:a14="http://schemas.microsoft.com/office/drawing/2010/main" xmlns="">
+              <a14:hiddenFill xmlns:a14="http://schemas.microsoft.com/office/drawing/2010/main">
                 <a:solidFill>
                   <a:schemeClr val="accent1"/>
                 </a:solidFill>
               </a14:hiddenFill>
             </a:ext>
             <a:ext uri="{91240B29-F687-4F45-9708-019B960494DF}">
-              <a14:hiddenLine xmlns:a14="http://schemas.microsoft.com/office/drawing/2010/main" xmlns="" w="9525">
+              <a14:hiddenLine xmlns:a14="http://schemas.microsoft.com/office/drawing/2010/main" w="9525">
                 <a:solidFill>
                   <a:schemeClr val="tx1"/>
                 </a:solidFill>
@@ -7379,7 +7557,7 @@
               </a14:hiddenLine>
             </a:ext>
             <a:ext uri="{AF507438-7753-43E0-B8FC-AC1667EBCBE1}">
-              <a14:hiddenEffects xmlns:a14="http://schemas.microsoft.com/office/drawing/2010/main" xmlns="">
+              <a14:hiddenEffects xmlns:a14="http://schemas.microsoft.com/office/drawing/2010/main">
                 <a:effectLst>
                   <a:outerShdw dist="35921" dir="2700000" algn="ctr" rotWithShape="0">
                     <a:schemeClr val="bg2"/>
@@ -7492,7 +7670,7 @@
     </p:spTree>
     <p:extLst>
       <p:ext uri="{BB962C8B-B14F-4D97-AF65-F5344CB8AC3E}">
-        <p14:creationId xmlns:p14="http://schemas.microsoft.com/office/powerpoint/2010/main" xmlns="" val="4095174797"/>
+        <p14:creationId xmlns:p14="http://schemas.microsoft.com/office/powerpoint/2010/main" val="4095174797"/>
       </p:ext>
     </p:extLst>
   </p:cSld>
@@ -7577,7 +7755,7 @@
           <a:blip r:embed="rId6" cstate="print">
             <a:extLst>
               <a:ext uri="{28A0092B-C50C-407E-A947-70E740481C1C}">
-                <a14:useLocalDpi xmlns:a14="http://schemas.microsoft.com/office/drawing/2010/main" xmlns="" val="0"/>
+                <a14:useLocalDpi xmlns:a14="http://schemas.microsoft.com/office/drawing/2010/main" val="0"/>
               </a:ext>
             </a:extLst>
           </a:blip>
@@ -7601,14 +7779,14 @@
           <a:effectLst/>
           <a:extLst>
             <a:ext uri="{909E8E84-426E-40DD-AFC4-6F175D3DCCD1}">
-              <a14:hiddenFill xmlns:a14="http://schemas.microsoft.com/office/drawing/2010/main" xmlns="">
+              <a14:hiddenFill xmlns:a14="http://schemas.microsoft.com/office/drawing/2010/main">
                 <a:solidFill>
                   <a:schemeClr val="accent1"/>
                 </a:solidFill>
               </a14:hiddenFill>
             </a:ext>
             <a:ext uri="{91240B29-F687-4F45-9708-019B960494DF}">
-              <a14:hiddenLine xmlns:a14="http://schemas.microsoft.com/office/drawing/2010/main" xmlns="" w="9525">
+              <a14:hiddenLine xmlns:a14="http://schemas.microsoft.com/office/drawing/2010/main" w="9525">
                 <a:solidFill>
                   <a:schemeClr val="tx1"/>
                 </a:solidFill>
@@ -7618,7 +7796,7 @@
               </a14:hiddenLine>
             </a:ext>
             <a:ext uri="{AF507438-7753-43E0-B8FC-AC1667EBCBE1}">
-              <a14:hiddenEffects xmlns:a14="http://schemas.microsoft.com/office/drawing/2010/main" xmlns="">
+              <a14:hiddenEffects xmlns:a14="http://schemas.microsoft.com/office/drawing/2010/main">
                 <a:effectLst>
                   <a:outerShdw dist="35921" dir="2700000" algn="ctr" rotWithShape="0">
                     <a:schemeClr val="bg2"/>
@@ -7646,7 +7824,7 @@
           <a:blip r:embed="rId7" cstate="print">
             <a:extLst>
               <a:ext uri="{28A0092B-C50C-407E-A947-70E740481C1C}">
-                <a14:useLocalDpi xmlns:a14="http://schemas.microsoft.com/office/drawing/2010/main" xmlns="" val="0"/>
+                <a14:useLocalDpi xmlns:a14="http://schemas.microsoft.com/office/drawing/2010/main" val="0"/>
               </a:ext>
             </a:extLst>
           </a:blip>
@@ -7670,14 +7848,14 @@
           <a:effectLst/>
           <a:extLst>
             <a:ext uri="{909E8E84-426E-40DD-AFC4-6F175D3DCCD1}">
-              <a14:hiddenFill xmlns:a14="http://schemas.microsoft.com/office/drawing/2010/main" xmlns="">
+              <a14:hiddenFill xmlns:a14="http://schemas.microsoft.com/office/drawing/2010/main">
                 <a:solidFill>
                   <a:schemeClr val="accent1"/>
                 </a:solidFill>
               </a14:hiddenFill>
             </a:ext>
             <a:ext uri="{91240B29-F687-4F45-9708-019B960494DF}">
-              <a14:hiddenLine xmlns:a14="http://schemas.microsoft.com/office/drawing/2010/main" xmlns="" w="9525">
+              <a14:hiddenLine xmlns:a14="http://schemas.microsoft.com/office/drawing/2010/main" w="9525">
                 <a:solidFill>
                   <a:schemeClr val="tx1"/>
                 </a:solidFill>
@@ -7687,7 +7865,7 @@
               </a14:hiddenLine>
             </a:ext>
             <a:ext uri="{AF507438-7753-43E0-B8FC-AC1667EBCBE1}">
-              <a14:hiddenEffects xmlns:a14="http://schemas.microsoft.com/office/drawing/2010/main" xmlns="">
+              <a14:hiddenEffects xmlns:a14="http://schemas.microsoft.com/office/drawing/2010/main">
                 <a:effectLst>
                   <a:outerShdw dist="35921" dir="2700000" algn="ctr" rotWithShape="0">
                     <a:schemeClr val="bg2"/>
@@ -7760,7 +7938,7 @@
     </p:spTree>
     <p:extLst>
       <p:ext uri="{BB962C8B-B14F-4D97-AF65-F5344CB8AC3E}">
-        <p14:creationId xmlns:p14="http://schemas.microsoft.com/office/powerpoint/2010/main" xmlns="" val="3670035473"/>
+        <p14:creationId xmlns:p14="http://schemas.microsoft.com/office/powerpoint/2010/main" val="3670035473"/>
       </p:ext>
     </p:extLst>
   </p:cSld>
@@ -7930,7 +8108,7 @@
           <a:blip r:embed="rId6" cstate="print">
             <a:extLst>
               <a:ext uri="{28A0092B-C50C-407E-A947-70E740481C1C}">
-                <a14:useLocalDpi xmlns:a14="http://schemas.microsoft.com/office/drawing/2010/main" xmlns="" val="0"/>
+                <a14:useLocalDpi xmlns:a14="http://schemas.microsoft.com/office/drawing/2010/main" val="0"/>
               </a:ext>
             </a:extLst>
           </a:blip>
@@ -7954,14 +8132,14 @@
           <a:effectLst/>
           <a:extLst>
             <a:ext uri="{909E8E84-426E-40DD-AFC4-6F175D3DCCD1}">
-              <a14:hiddenFill xmlns:a14="http://schemas.microsoft.com/office/drawing/2010/main" xmlns="">
+              <a14:hiddenFill xmlns:a14="http://schemas.microsoft.com/office/drawing/2010/main">
                 <a:solidFill>
                   <a:schemeClr val="accent1"/>
                 </a:solidFill>
               </a14:hiddenFill>
             </a:ext>
             <a:ext uri="{91240B29-F687-4F45-9708-019B960494DF}">
-              <a14:hiddenLine xmlns:a14="http://schemas.microsoft.com/office/drawing/2010/main" xmlns="" w="9525">
+              <a14:hiddenLine xmlns:a14="http://schemas.microsoft.com/office/drawing/2010/main" w="9525">
                 <a:solidFill>
                   <a:schemeClr val="tx1"/>
                 </a:solidFill>
@@ -7971,7 +8149,7 @@
               </a14:hiddenLine>
             </a:ext>
             <a:ext uri="{AF507438-7753-43E0-B8FC-AC1667EBCBE1}">
-              <a14:hiddenEffects xmlns:a14="http://schemas.microsoft.com/office/drawing/2010/main" xmlns="">
+              <a14:hiddenEffects xmlns:a14="http://schemas.microsoft.com/office/drawing/2010/main">
                 <a:effectLst>
                   <a:outerShdw dist="35921" dir="2700000" algn="ctr" rotWithShape="0">
                     <a:schemeClr val="bg2"/>
@@ -7998,7 +8176,7 @@
           <a:blip r:embed="rId7" cstate="print">
             <a:extLst>
               <a:ext uri="{28A0092B-C50C-407E-A947-70E740481C1C}">
-                <a14:useLocalDpi xmlns:a14="http://schemas.microsoft.com/office/drawing/2010/main" xmlns="" val="0"/>
+                <a14:useLocalDpi xmlns:a14="http://schemas.microsoft.com/office/drawing/2010/main" val="0"/>
               </a:ext>
             </a:extLst>
           </a:blip>
@@ -8022,14 +8200,14 @@
           <a:effectLst/>
           <a:extLst>
             <a:ext uri="{909E8E84-426E-40DD-AFC4-6F175D3DCCD1}">
-              <a14:hiddenFill xmlns:a14="http://schemas.microsoft.com/office/drawing/2010/main" xmlns="">
+              <a14:hiddenFill xmlns:a14="http://schemas.microsoft.com/office/drawing/2010/main">
                 <a:solidFill>
                   <a:schemeClr val="accent1"/>
                 </a:solidFill>
               </a14:hiddenFill>
             </a:ext>
             <a:ext uri="{91240B29-F687-4F45-9708-019B960494DF}">
-              <a14:hiddenLine xmlns:a14="http://schemas.microsoft.com/office/drawing/2010/main" xmlns="" w="9525">
+              <a14:hiddenLine xmlns:a14="http://schemas.microsoft.com/office/drawing/2010/main" w="9525">
                 <a:solidFill>
                   <a:schemeClr val="tx1"/>
                 </a:solidFill>
@@ -8039,7 +8217,7 @@
               </a14:hiddenLine>
             </a:ext>
             <a:ext uri="{AF507438-7753-43E0-B8FC-AC1667EBCBE1}">
-              <a14:hiddenEffects xmlns:a14="http://schemas.microsoft.com/office/drawing/2010/main" xmlns="">
+              <a14:hiddenEffects xmlns:a14="http://schemas.microsoft.com/office/drawing/2010/main">
                 <a:effectLst>
                   <a:outerShdw dist="35921" dir="2700000" algn="ctr" rotWithShape="0">
                     <a:schemeClr val="bg2"/>
@@ -8053,7 +8231,7 @@
     </p:spTree>
     <p:extLst>
       <p:ext uri="{BB962C8B-B14F-4D97-AF65-F5344CB8AC3E}">
-        <p14:creationId xmlns:p14="http://schemas.microsoft.com/office/powerpoint/2010/main" xmlns="" val="830870510"/>
+        <p14:creationId xmlns:p14="http://schemas.microsoft.com/office/powerpoint/2010/main" val="830870510"/>
       </p:ext>
     </p:extLst>
   </p:cSld>
@@ -8084,55 +8262,55 @@
 
 <file path=ppt/tags/tag11.xml><?xml version="1.0" encoding="utf-8"?>
 <p:tagLst xmlns:a="http://schemas.openxmlformats.org/drawingml/2006/main" xmlns:r="http://schemas.openxmlformats.org/officeDocument/2006/relationships" xmlns:p="http://schemas.openxmlformats.org/presentationml/2006/main">
+  <p:tag name="NUM" val="2"/>
+</p:tagLst>
+</file>
+
+<file path=ppt/tags/tag12.xml><?xml version="1.0" encoding="utf-8"?>
+<p:tagLst xmlns:a="http://schemas.openxmlformats.org/drawingml/2006/main" xmlns:r="http://schemas.openxmlformats.org/officeDocument/2006/relationships" xmlns:p="http://schemas.openxmlformats.org/presentationml/2006/main">
+  <p:tag name="NUM" val="3"/>
+</p:tagLst>
+</file>
+
+<file path=ppt/tags/tag13.xml><?xml version="1.0" encoding="utf-8"?>
+<p:tagLst xmlns:a="http://schemas.openxmlformats.org/drawingml/2006/main" xmlns:r="http://schemas.openxmlformats.org/officeDocument/2006/relationships" xmlns:p="http://schemas.openxmlformats.org/presentationml/2006/main">
   <p:tag name="NUM" val="1"/>
 </p:tagLst>
 </file>
 
-<file path=ppt/tags/tag12.xml><?xml version="1.0" encoding="utf-8"?>
+<file path=ppt/tags/tag14.xml><?xml version="1.0" encoding="utf-8"?>
 <p:tagLst xmlns:a="http://schemas.openxmlformats.org/drawingml/2006/main" xmlns:r="http://schemas.openxmlformats.org/officeDocument/2006/relationships" xmlns:p="http://schemas.openxmlformats.org/presentationml/2006/main">
   <p:tag name="NUM" val="2"/>
 </p:tagLst>
 </file>
 
-<file path=ppt/tags/tag13.xml><?xml version="1.0" encoding="utf-8"?>
+<file path=ppt/tags/tag15.xml><?xml version="1.0" encoding="utf-8"?>
 <p:tagLst xmlns:a="http://schemas.openxmlformats.org/drawingml/2006/main" xmlns:r="http://schemas.openxmlformats.org/officeDocument/2006/relationships" xmlns:p="http://schemas.openxmlformats.org/presentationml/2006/main">
   <p:tag name="NUM" val="3"/>
 </p:tagLst>
 </file>
 
-<file path=ppt/tags/tag14.xml><?xml version="1.0" encoding="utf-8"?>
+<file path=ppt/tags/tag16.xml><?xml version="1.0" encoding="utf-8"?>
+<p:tagLst xmlns:a="http://schemas.openxmlformats.org/drawingml/2006/main" xmlns:r="http://schemas.openxmlformats.org/officeDocument/2006/relationships" xmlns:p="http://schemas.openxmlformats.org/presentationml/2006/main">
+  <p:tag name="NUM" val="4"/>
+</p:tagLst>
+</file>
+
+<file path=ppt/tags/tag17.xml><?xml version="1.0" encoding="utf-8"?>
 <p:tagLst xmlns:a="http://schemas.openxmlformats.org/drawingml/2006/main" xmlns:r="http://schemas.openxmlformats.org/officeDocument/2006/relationships" xmlns:p="http://schemas.openxmlformats.org/presentationml/2006/main">
   <p:tag name="NUM" val="1"/>
 </p:tagLst>
 </file>
 
-<file path=ppt/tags/tag15.xml><?xml version="1.0" encoding="utf-8"?>
+<file path=ppt/tags/tag18.xml><?xml version="1.0" encoding="utf-8"?>
 <p:tagLst xmlns:a="http://schemas.openxmlformats.org/drawingml/2006/main" xmlns:r="http://schemas.openxmlformats.org/officeDocument/2006/relationships" xmlns:p="http://schemas.openxmlformats.org/presentationml/2006/main">
   <p:tag name="NUM" val="2"/>
 </p:tagLst>
 </file>
 
-<file path=ppt/tags/tag16.xml><?xml version="1.0" encoding="utf-8"?>
+<file path=ppt/tags/tag19.xml><?xml version="1.0" encoding="utf-8"?>
 <p:tagLst xmlns:a="http://schemas.openxmlformats.org/drawingml/2006/main" xmlns:r="http://schemas.openxmlformats.org/officeDocument/2006/relationships" xmlns:p="http://schemas.openxmlformats.org/presentationml/2006/main">
   <p:tag name="NUM" val="3"/>
-</p:tagLst>
-</file>
-
-<file path=ppt/tags/tag17.xml><?xml version="1.0" encoding="utf-8"?>
-<p:tagLst xmlns:a="http://schemas.openxmlformats.org/drawingml/2006/main" xmlns:r="http://schemas.openxmlformats.org/officeDocument/2006/relationships" xmlns:p="http://schemas.openxmlformats.org/presentationml/2006/main">
-  <p:tag name="NUM" val="4"/>
-</p:tagLst>
-</file>
-
-<file path=ppt/tags/tag18.xml><?xml version="1.0" encoding="utf-8"?>
-<p:tagLst xmlns:a="http://schemas.openxmlformats.org/drawingml/2006/main" xmlns:r="http://schemas.openxmlformats.org/officeDocument/2006/relationships" xmlns:p="http://schemas.openxmlformats.org/presentationml/2006/main">
-  <p:tag name="NUM" val="1"/>
-</p:tagLst>
-</file>
-
-<file path=ppt/tags/tag19.xml><?xml version="1.0" encoding="utf-8"?>
-<p:tagLst xmlns:a="http://schemas.openxmlformats.org/drawingml/2006/main" xmlns:r="http://schemas.openxmlformats.org/officeDocument/2006/relationships" xmlns:p="http://schemas.openxmlformats.org/presentationml/2006/main">
-  <p:tag name="NUM" val="2"/>
 </p:tagLst>
 </file>
 
@@ -8144,49 +8322,49 @@
 
 <file path=ppt/tags/tag20.xml><?xml version="1.0" encoding="utf-8"?>
 <p:tagLst xmlns:a="http://schemas.openxmlformats.org/drawingml/2006/main" xmlns:r="http://schemas.openxmlformats.org/officeDocument/2006/relationships" xmlns:p="http://schemas.openxmlformats.org/presentationml/2006/main">
+  <p:tag name="NUM" val="4"/>
+</p:tagLst>
+</file>
+
+<file path=ppt/tags/tag21.xml><?xml version="1.0" encoding="utf-8"?>
+<p:tagLst xmlns:a="http://schemas.openxmlformats.org/drawingml/2006/main" xmlns:r="http://schemas.openxmlformats.org/officeDocument/2006/relationships" xmlns:p="http://schemas.openxmlformats.org/presentationml/2006/main">
+  <p:tag name="NUM" val="1"/>
+</p:tagLst>
+</file>
+
+<file path=ppt/tags/tag22.xml><?xml version="1.0" encoding="utf-8"?>
+<p:tagLst xmlns:a="http://schemas.openxmlformats.org/drawingml/2006/main" xmlns:r="http://schemas.openxmlformats.org/officeDocument/2006/relationships" xmlns:p="http://schemas.openxmlformats.org/presentationml/2006/main">
+  <p:tag name="NUM" val="2"/>
+</p:tagLst>
+</file>
+
+<file path=ppt/tags/tag23.xml><?xml version="1.0" encoding="utf-8"?>
+<p:tagLst xmlns:a="http://schemas.openxmlformats.org/drawingml/2006/main" xmlns:r="http://schemas.openxmlformats.org/officeDocument/2006/relationships" xmlns:p="http://schemas.openxmlformats.org/presentationml/2006/main">
   <p:tag name="NUM" val="3"/>
 </p:tagLst>
 </file>
 
-<file path=ppt/tags/tag21.xml><?xml version="1.0" encoding="utf-8"?>
+<file path=ppt/tags/tag24.xml><?xml version="1.0" encoding="utf-8"?>
 <p:tagLst xmlns:a="http://schemas.openxmlformats.org/drawingml/2006/main" xmlns:r="http://schemas.openxmlformats.org/officeDocument/2006/relationships" xmlns:p="http://schemas.openxmlformats.org/presentationml/2006/main">
   <p:tag name="NUM" val="4"/>
 </p:tagLst>
 </file>
 
-<file path=ppt/tags/tag22.xml><?xml version="1.0" encoding="utf-8"?>
+<file path=ppt/tags/tag25.xml><?xml version="1.0" encoding="utf-8"?>
 <p:tagLst xmlns:a="http://schemas.openxmlformats.org/drawingml/2006/main" xmlns:r="http://schemas.openxmlformats.org/officeDocument/2006/relationships" xmlns:p="http://schemas.openxmlformats.org/presentationml/2006/main">
   <p:tag name="NUM" val="1"/>
 </p:tagLst>
 </file>
 
-<file path=ppt/tags/tag23.xml><?xml version="1.0" encoding="utf-8"?>
+<file path=ppt/tags/tag26.xml><?xml version="1.0" encoding="utf-8"?>
 <p:tagLst xmlns:a="http://schemas.openxmlformats.org/drawingml/2006/main" xmlns:r="http://schemas.openxmlformats.org/officeDocument/2006/relationships" xmlns:p="http://schemas.openxmlformats.org/presentationml/2006/main">
   <p:tag name="NUM" val="2"/>
 </p:tagLst>
 </file>
 
-<file path=ppt/tags/tag24.xml><?xml version="1.0" encoding="utf-8"?>
-<p:tagLst xmlns:a="http://schemas.openxmlformats.org/drawingml/2006/main" xmlns:r="http://schemas.openxmlformats.org/officeDocument/2006/relationships" xmlns:p="http://schemas.openxmlformats.org/presentationml/2006/main">
-  <p:tag name="NUM" val="3"/>
-</p:tagLst>
-</file>
-
-<file path=ppt/tags/tag25.xml><?xml version="1.0" encoding="utf-8"?>
-<p:tagLst xmlns:a="http://schemas.openxmlformats.org/drawingml/2006/main" xmlns:r="http://schemas.openxmlformats.org/officeDocument/2006/relationships" xmlns:p="http://schemas.openxmlformats.org/presentationml/2006/main">
-  <p:tag name="NUM" val="4"/>
-</p:tagLst>
-</file>
-
-<file path=ppt/tags/tag26.xml><?xml version="1.0" encoding="utf-8"?>
+<file path=ppt/tags/tag27.xml><?xml version="1.0" encoding="utf-8"?>
 <p:tagLst xmlns:a="http://schemas.openxmlformats.org/drawingml/2006/main" xmlns:r="http://schemas.openxmlformats.org/officeDocument/2006/relationships" xmlns:p="http://schemas.openxmlformats.org/presentationml/2006/main">
   <p:tag name="NUM" val="1"/>
-</p:tagLst>
-</file>
-
-<file path=ppt/tags/tag27.xml><?xml version="1.0" encoding="utf-8"?>
-<p:tagLst xmlns:a="http://schemas.openxmlformats.org/drawingml/2006/main" xmlns:r="http://schemas.openxmlformats.org/officeDocument/2006/relationships" xmlns:p="http://schemas.openxmlformats.org/presentationml/2006/main">
-  <p:tag name="NUM" val="2"/>
 </p:tagLst>
 </file>
 
@@ -8198,7 +8376,7 @@
 
 <file path=ppt/tags/tag29.xml><?xml version="1.0" encoding="utf-8"?>
 <p:tagLst xmlns:a="http://schemas.openxmlformats.org/drawingml/2006/main" xmlns:r="http://schemas.openxmlformats.org/officeDocument/2006/relationships" xmlns:p="http://schemas.openxmlformats.org/presentationml/2006/main">
-  <p:tag name="NUM" val="1"/>
+  <p:tag name="NUM" val="2"/>
 </p:tagLst>
 </file>
 
@@ -8210,61 +8388,61 @@
 
 <file path=ppt/tags/tag30.xml><?xml version="1.0" encoding="utf-8"?>
 <p:tagLst xmlns:a="http://schemas.openxmlformats.org/drawingml/2006/main" xmlns:r="http://schemas.openxmlformats.org/officeDocument/2006/relationships" xmlns:p="http://schemas.openxmlformats.org/presentationml/2006/main">
+  <p:tag name="NUM" val="1"/>
+</p:tagLst>
+</file>
+
+<file path=ppt/tags/tag31.xml><?xml version="1.0" encoding="utf-8"?>
+<p:tagLst xmlns:a="http://schemas.openxmlformats.org/drawingml/2006/main" xmlns:r="http://schemas.openxmlformats.org/officeDocument/2006/relationships" xmlns:p="http://schemas.openxmlformats.org/presentationml/2006/main">
   <p:tag name="NUM" val="2"/>
 </p:tagLst>
 </file>
 
-<file path=ppt/tags/tag31.xml><?xml version="1.0" encoding="utf-8"?>
+<file path=ppt/tags/tag32.xml><?xml version="1.0" encoding="utf-8"?>
+<p:tagLst xmlns:a="http://schemas.openxmlformats.org/drawingml/2006/main" xmlns:r="http://schemas.openxmlformats.org/officeDocument/2006/relationships" xmlns:p="http://schemas.openxmlformats.org/presentationml/2006/main">
+  <p:tag name="NUM" val="3"/>
+</p:tagLst>
+</file>
+
+<file path=ppt/tags/tag33.xml><?xml version="1.0" encoding="utf-8"?>
+<p:tagLst xmlns:a="http://schemas.openxmlformats.org/drawingml/2006/main" xmlns:r="http://schemas.openxmlformats.org/officeDocument/2006/relationships" xmlns:p="http://schemas.openxmlformats.org/presentationml/2006/main">
+  <p:tag name="NUM" val="4"/>
+</p:tagLst>
+</file>
+
+<file path=ppt/tags/tag34.xml><?xml version="1.0" encoding="utf-8"?>
+<p:tagLst xmlns:a="http://schemas.openxmlformats.org/drawingml/2006/main" xmlns:r="http://schemas.openxmlformats.org/officeDocument/2006/relationships" xmlns:p="http://schemas.openxmlformats.org/presentationml/2006/main">
+  <p:tag name="NUM" val="5"/>
+</p:tagLst>
+</file>
+
+<file path=ppt/tags/tag35.xml><?xml version="1.0" encoding="utf-8"?>
 <p:tagLst xmlns:a="http://schemas.openxmlformats.org/drawingml/2006/main" xmlns:r="http://schemas.openxmlformats.org/officeDocument/2006/relationships" xmlns:p="http://schemas.openxmlformats.org/presentationml/2006/main">
   <p:tag name="NUM" val="1"/>
 </p:tagLst>
 </file>
 
-<file path=ppt/tags/tag32.xml><?xml version="1.0" encoding="utf-8"?>
+<file path=ppt/tags/tag36.xml><?xml version="1.0" encoding="utf-8"?>
 <p:tagLst xmlns:a="http://schemas.openxmlformats.org/drawingml/2006/main" xmlns:r="http://schemas.openxmlformats.org/officeDocument/2006/relationships" xmlns:p="http://schemas.openxmlformats.org/presentationml/2006/main">
   <p:tag name="NUM" val="2"/>
 </p:tagLst>
 </file>
 
-<file path=ppt/tags/tag33.xml><?xml version="1.0" encoding="utf-8"?>
+<file path=ppt/tags/tag37.xml><?xml version="1.0" encoding="utf-8"?>
 <p:tagLst xmlns:a="http://schemas.openxmlformats.org/drawingml/2006/main" xmlns:r="http://schemas.openxmlformats.org/officeDocument/2006/relationships" xmlns:p="http://schemas.openxmlformats.org/presentationml/2006/main">
   <p:tag name="NUM" val="3"/>
 </p:tagLst>
 </file>
 
-<file path=ppt/tags/tag34.xml><?xml version="1.0" encoding="utf-8"?>
-<p:tagLst xmlns:a="http://schemas.openxmlformats.org/drawingml/2006/main" xmlns:r="http://schemas.openxmlformats.org/officeDocument/2006/relationships" xmlns:p="http://schemas.openxmlformats.org/presentationml/2006/main">
-  <p:tag name="NUM" val="4"/>
-</p:tagLst>
-</file>
-
-<file path=ppt/tags/tag35.xml><?xml version="1.0" encoding="utf-8"?>
-<p:tagLst xmlns:a="http://schemas.openxmlformats.org/drawingml/2006/main" xmlns:r="http://schemas.openxmlformats.org/officeDocument/2006/relationships" xmlns:p="http://schemas.openxmlformats.org/presentationml/2006/main">
-  <p:tag name="NUM" val="5"/>
-</p:tagLst>
-</file>
-
-<file path=ppt/tags/tag36.xml><?xml version="1.0" encoding="utf-8"?>
+<file path=ppt/tags/tag38.xml><?xml version="1.0" encoding="utf-8"?>
 <p:tagLst xmlns:a="http://schemas.openxmlformats.org/drawingml/2006/main" xmlns:r="http://schemas.openxmlformats.org/officeDocument/2006/relationships" xmlns:p="http://schemas.openxmlformats.org/presentationml/2006/main">
   <p:tag name="NUM" val="1"/>
 </p:tagLst>
 </file>
 
-<file path=ppt/tags/tag37.xml><?xml version="1.0" encoding="utf-8"?>
+<file path=ppt/tags/tag39.xml><?xml version="1.0" encoding="utf-8"?>
 <p:tagLst xmlns:a="http://schemas.openxmlformats.org/drawingml/2006/main" xmlns:r="http://schemas.openxmlformats.org/officeDocument/2006/relationships" xmlns:p="http://schemas.openxmlformats.org/presentationml/2006/main">
   <p:tag name="NUM" val="2"/>
-</p:tagLst>
-</file>
-
-<file path=ppt/tags/tag38.xml><?xml version="1.0" encoding="utf-8"?>
-<p:tagLst xmlns:a="http://schemas.openxmlformats.org/drawingml/2006/main" xmlns:r="http://schemas.openxmlformats.org/officeDocument/2006/relationships" xmlns:p="http://schemas.openxmlformats.org/presentationml/2006/main">
-  <p:tag name="NUM" val="3"/>
-</p:tagLst>
-</file>
-
-<file path=ppt/tags/tag39.xml><?xml version="1.0" encoding="utf-8"?>
-<p:tagLst xmlns:a="http://schemas.openxmlformats.org/drawingml/2006/main" xmlns:r="http://schemas.openxmlformats.org/officeDocument/2006/relationships" xmlns:p="http://schemas.openxmlformats.org/presentationml/2006/main">
-  <p:tag name="NUM" val="1"/>
 </p:tagLst>
 </file>
 
@@ -8276,43 +8454,43 @@
 
 <file path=ppt/tags/tag40.xml><?xml version="1.0" encoding="utf-8"?>
 <p:tagLst xmlns:a="http://schemas.openxmlformats.org/drawingml/2006/main" xmlns:r="http://schemas.openxmlformats.org/officeDocument/2006/relationships" xmlns:p="http://schemas.openxmlformats.org/presentationml/2006/main">
-  <p:tag name="NUM" val="2"/>
-</p:tagLst>
-</file>
-
-<file path=ppt/tags/tag41.xml><?xml version="1.0" encoding="utf-8"?>
-<p:tagLst xmlns:a="http://schemas.openxmlformats.org/drawingml/2006/main" xmlns:r="http://schemas.openxmlformats.org/officeDocument/2006/relationships" xmlns:p="http://schemas.openxmlformats.org/presentationml/2006/main">
   <p:tag name="NUM" val="1"/>
 </p:tagLst>
 </file>
 
-<file path=ppt/tags/tag42.xml><?xml version="1.0" encoding="utf-8"?>
+<file path=ppt/tags/tag41.xml><?xml version="1.0" encoding="utf-8"?>
 <p:tagLst xmlns:a="http://schemas.openxmlformats.org/drawingml/2006/main" xmlns:r="http://schemas.openxmlformats.org/officeDocument/2006/relationships" xmlns:p="http://schemas.openxmlformats.org/presentationml/2006/main">
   <p:tag name="NUM" val="2"/>
 </p:tagLst>
 </file>
 
-<file path=ppt/tags/tag43.xml><?xml version="1.0" encoding="utf-8"?>
+<file path=ppt/tags/tag42.xml><?xml version="1.0" encoding="utf-8"?>
 <p:tagLst xmlns:a="http://schemas.openxmlformats.org/drawingml/2006/main" xmlns:r="http://schemas.openxmlformats.org/officeDocument/2006/relationships" xmlns:p="http://schemas.openxmlformats.org/presentationml/2006/main">
   <p:tag name="NUM" val="3"/>
 </p:tagLst>
 </file>
 
-<file path=ppt/tags/tag44.xml><?xml version="1.0" encoding="utf-8"?>
+<file path=ppt/tags/tag43.xml><?xml version="1.0" encoding="utf-8"?>
 <p:tagLst xmlns:a="http://schemas.openxmlformats.org/drawingml/2006/main" xmlns:r="http://schemas.openxmlformats.org/officeDocument/2006/relationships" xmlns:p="http://schemas.openxmlformats.org/presentationml/2006/main">
   <p:tag name="NUM" val="4"/>
 </p:tagLst>
 </file>
 
-<file path=ppt/tags/tag45.xml><?xml version="1.0" encoding="utf-8"?>
+<file path=ppt/tags/tag44.xml><?xml version="1.0" encoding="utf-8"?>
 <p:tagLst xmlns:a="http://schemas.openxmlformats.org/drawingml/2006/main" xmlns:r="http://schemas.openxmlformats.org/officeDocument/2006/relationships" xmlns:p="http://schemas.openxmlformats.org/presentationml/2006/main">
   <p:tag name="NUM" val="5"/>
 </p:tagLst>
 </file>
 
+<file path=ppt/tags/tag45.xml><?xml version="1.0" encoding="utf-8"?>
+<p:tagLst xmlns:a="http://schemas.openxmlformats.org/drawingml/2006/main" xmlns:r="http://schemas.openxmlformats.org/officeDocument/2006/relationships" xmlns:p="http://schemas.openxmlformats.org/presentationml/2006/main">
+  <p:tag name="NUM" val="6"/>
+</p:tagLst>
+</file>
+
 <file path=ppt/tags/tag46.xml><?xml version="1.0" encoding="utf-8"?>
 <p:tagLst xmlns:a="http://schemas.openxmlformats.org/drawingml/2006/main" xmlns:r="http://schemas.openxmlformats.org/officeDocument/2006/relationships" xmlns:p="http://schemas.openxmlformats.org/presentationml/2006/main">
-  <p:tag name="NUM" val="6"/>
+  <p:tag name="NUM" val="1"/>
 </p:tagLst>
 </file>
 
@@ -8324,13 +8502,13 @@
 
 <file path=ppt/tags/tag48.xml><?xml version="1.0" encoding="utf-8"?>
 <p:tagLst xmlns:a="http://schemas.openxmlformats.org/drawingml/2006/main" xmlns:r="http://schemas.openxmlformats.org/officeDocument/2006/relationships" xmlns:p="http://schemas.openxmlformats.org/presentationml/2006/main">
-  <p:tag name="NUM" val="1"/>
+  <p:tag name="NUM" val="2"/>
 </p:tagLst>
 </file>
 
 <file path=ppt/tags/tag49.xml><?xml version="1.0" encoding="utf-8"?>
 <p:tagLst xmlns:a="http://schemas.openxmlformats.org/drawingml/2006/main" xmlns:r="http://schemas.openxmlformats.org/officeDocument/2006/relationships" xmlns:p="http://schemas.openxmlformats.org/presentationml/2006/main">
-  <p:tag name="NUM" val="2"/>
+  <p:tag name="NUM" val="3"/>
 </p:tagLst>
 </file>
 
@@ -8342,61 +8520,61 @@
 
 <file path=ppt/tags/tag50.xml><?xml version="1.0" encoding="utf-8"?>
 <p:tagLst xmlns:a="http://schemas.openxmlformats.org/drawingml/2006/main" xmlns:r="http://schemas.openxmlformats.org/officeDocument/2006/relationships" xmlns:p="http://schemas.openxmlformats.org/presentationml/2006/main">
+  <p:tag name="NUM" val="1"/>
+</p:tagLst>
+</file>
+
+<file path=ppt/tags/tag51.xml><?xml version="1.0" encoding="utf-8"?>
+<p:tagLst xmlns:a="http://schemas.openxmlformats.org/drawingml/2006/main" xmlns:r="http://schemas.openxmlformats.org/officeDocument/2006/relationships" xmlns:p="http://schemas.openxmlformats.org/presentationml/2006/main">
+  <p:tag name="NUM" val="2"/>
+</p:tagLst>
+</file>
+
+<file path=ppt/tags/tag52.xml><?xml version="1.0" encoding="utf-8"?>
+<p:tagLst xmlns:a="http://schemas.openxmlformats.org/drawingml/2006/main" xmlns:r="http://schemas.openxmlformats.org/officeDocument/2006/relationships" xmlns:p="http://schemas.openxmlformats.org/presentationml/2006/main">
   <p:tag name="NUM" val="3"/>
 </p:tagLst>
 </file>
 
-<file path=ppt/tags/tag51.xml><?xml version="1.0" encoding="utf-8"?>
+<file path=ppt/tags/tag53.xml><?xml version="1.0" encoding="utf-8"?>
 <p:tagLst xmlns:a="http://schemas.openxmlformats.org/drawingml/2006/main" xmlns:r="http://schemas.openxmlformats.org/officeDocument/2006/relationships" xmlns:p="http://schemas.openxmlformats.org/presentationml/2006/main">
   <p:tag name="NUM" val="1"/>
 </p:tagLst>
 </file>
 
-<file path=ppt/tags/tag52.xml><?xml version="1.0" encoding="utf-8"?>
+<file path=ppt/tags/tag54.xml><?xml version="1.0" encoding="utf-8"?>
 <p:tagLst xmlns:a="http://schemas.openxmlformats.org/drawingml/2006/main" xmlns:r="http://schemas.openxmlformats.org/officeDocument/2006/relationships" xmlns:p="http://schemas.openxmlformats.org/presentationml/2006/main">
   <p:tag name="NUM" val="2"/>
 </p:tagLst>
 </file>
 
-<file path=ppt/tags/tag53.xml><?xml version="1.0" encoding="utf-8"?>
+<file path=ppt/tags/tag55.xml><?xml version="1.0" encoding="utf-8"?>
 <p:tagLst xmlns:a="http://schemas.openxmlformats.org/drawingml/2006/main" xmlns:r="http://schemas.openxmlformats.org/officeDocument/2006/relationships" xmlns:p="http://schemas.openxmlformats.org/presentationml/2006/main">
   <p:tag name="NUM" val="3"/>
 </p:tagLst>
 </file>
 
-<file path=ppt/tags/tag54.xml><?xml version="1.0" encoding="utf-8"?>
+<file path=ppt/tags/tag56.xml><?xml version="1.0" encoding="utf-8"?>
 <p:tagLst xmlns:a="http://schemas.openxmlformats.org/drawingml/2006/main" xmlns:r="http://schemas.openxmlformats.org/officeDocument/2006/relationships" xmlns:p="http://schemas.openxmlformats.org/presentationml/2006/main">
   <p:tag name="NUM" val="1"/>
 </p:tagLst>
 </file>
 
-<file path=ppt/tags/tag55.xml><?xml version="1.0" encoding="utf-8"?>
+<file path=ppt/tags/tag57.xml><?xml version="1.0" encoding="utf-8"?>
 <p:tagLst xmlns:a="http://schemas.openxmlformats.org/drawingml/2006/main" xmlns:r="http://schemas.openxmlformats.org/officeDocument/2006/relationships" xmlns:p="http://schemas.openxmlformats.org/presentationml/2006/main">
   <p:tag name="NUM" val="2"/>
 </p:tagLst>
 </file>
 
-<file path=ppt/tags/tag56.xml><?xml version="1.0" encoding="utf-8"?>
+<file path=ppt/tags/tag58.xml><?xml version="1.0" encoding="utf-8"?>
 <p:tagLst xmlns:a="http://schemas.openxmlformats.org/drawingml/2006/main" xmlns:r="http://schemas.openxmlformats.org/officeDocument/2006/relationships" xmlns:p="http://schemas.openxmlformats.org/presentationml/2006/main">
   <p:tag name="NUM" val="3"/>
 </p:tagLst>
 </file>
 
-<file path=ppt/tags/tag57.xml><?xml version="1.0" encoding="utf-8"?>
+<file path=ppt/tags/tag59.xml><?xml version="1.0" encoding="utf-8"?>
 <p:tagLst xmlns:a="http://schemas.openxmlformats.org/drawingml/2006/main" xmlns:r="http://schemas.openxmlformats.org/officeDocument/2006/relationships" xmlns:p="http://schemas.openxmlformats.org/presentationml/2006/main">
   <p:tag name="NUM" val="1"/>
-</p:tagLst>
-</file>
-
-<file path=ppt/tags/tag58.xml><?xml version="1.0" encoding="utf-8"?>
-<p:tagLst xmlns:a="http://schemas.openxmlformats.org/drawingml/2006/main" xmlns:r="http://schemas.openxmlformats.org/officeDocument/2006/relationships" xmlns:p="http://schemas.openxmlformats.org/presentationml/2006/main">
-  <p:tag name="NUM" val="2"/>
-</p:tagLst>
-</file>
-
-<file path=ppt/tags/tag59.xml><?xml version="1.0" encoding="utf-8"?>
-<p:tagLst xmlns:a="http://schemas.openxmlformats.org/drawingml/2006/main" xmlns:r="http://schemas.openxmlformats.org/officeDocument/2006/relationships" xmlns:p="http://schemas.openxmlformats.org/presentationml/2006/main">
-  <p:tag name="NUM" val="3"/>
 </p:tagLst>
 </file>
 
@@ -8408,13 +8586,13 @@
 
 <file path=ppt/tags/tag60.xml><?xml version="1.0" encoding="utf-8"?>
 <p:tagLst xmlns:a="http://schemas.openxmlformats.org/drawingml/2006/main" xmlns:r="http://schemas.openxmlformats.org/officeDocument/2006/relationships" xmlns:p="http://schemas.openxmlformats.org/presentationml/2006/main">
-  <p:tag name="NUM" val="1"/>
+  <p:tag name="NUM" val="2"/>
 </p:tagLst>
 </file>
 
 <file path=ppt/tags/tag61.xml><?xml version="1.0" encoding="utf-8"?>
 <p:tagLst xmlns:a="http://schemas.openxmlformats.org/drawingml/2006/main" xmlns:r="http://schemas.openxmlformats.org/officeDocument/2006/relationships" xmlns:p="http://schemas.openxmlformats.org/presentationml/2006/main">
-  <p:tag name="NUM" val="2"/>
+  <p:tag name="NUM" val="1"/>
 </p:tagLst>
 </file>
 
@@ -8426,31 +8604,13 @@
 
 <file path=ppt/tags/tag63.xml><?xml version="1.0" encoding="utf-8"?>
 <p:tagLst xmlns:a="http://schemas.openxmlformats.org/drawingml/2006/main" xmlns:r="http://schemas.openxmlformats.org/officeDocument/2006/relationships" xmlns:p="http://schemas.openxmlformats.org/presentationml/2006/main">
-  <p:tag name="NUM" val="2"/>
+  <p:tag name="NUM" val="1"/>
 </p:tagLst>
 </file>
 
 <file path=ppt/tags/tag64.xml><?xml version="1.0" encoding="utf-8"?>
 <p:tagLst xmlns:a="http://schemas.openxmlformats.org/drawingml/2006/main" xmlns:r="http://schemas.openxmlformats.org/officeDocument/2006/relationships" xmlns:p="http://schemas.openxmlformats.org/presentationml/2006/main">
-  <p:tag name="NUM" val="1"/>
-</p:tagLst>
-</file>
-
-<file path=ppt/tags/tag65.xml><?xml version="1.0" encoding="utf-8"?>
-<p:tagLst xmlns:a="http://schemas.openxmlformats.org/drawingml/2006/main" xmlns:r="http://schemas.openxmlformats.org/officeDocument/2006/relationships" xmlns:p="http://schemas.openxmlformats.org/presentationml/2006/main">
-  <p:tag name="NUM" val="1"/>
-</p:tagLst>
-</file>
-
-<file path=ppt/tags/tag66.xml><?xml version="1.0" encoding="utf-8"?>
-<p:tagLst xmlns:a="http://schemas.openxmlformats.org/drawingml/2006/main" xmlns:r="http://schemas.openxmlformats.org/officeDocument/2006/relationships" xmlns:p="http://schemas.openxmlformats.org/presentationml/2006/main">
   <p:tag name="NUM" val="2"/>
-</p:tagLst>
-</file>
-
-<file path=ppt/tags/tag67.xml><?xml version="1.0" encoding="utf-8"?>
-<p:tagLst xmlns:a="http://schemas.openxmlformats.org/drawingml/2006/main" xmlns:r="http://schemas.openxmlformats.org/officeDocument/2006/relationships" xmlns:p="http://schemas.openxmlformats.org/presentationml/2006/main">
-  <p:tag name="NUM" val="3"/>
 </p:tagLst>
 </file>
 
@@ -8462,13 +8622,13 @@
 
 <file path=ppt/tags/tag8.xml><?xml version="1.0" encoding="utf-8"?>
 <p:tagLst xmlns:a="http://schemas.openxmlformats.org/drawingml/2006/main" xmlns:r="http://schemas.openxmlformats.org/officeDocument/2006/relationships" xmlns:p="http://schemas.openxmlformats.org/presentationml/2006/main">
-  <p:tag name="NUM" val="1"/>
+  <p:tag name="NUM" val="2"/>
 </p:tagLst>
 </file>
 
 <file path=ppt/tags/tag9.xml><?xml version="1.0" encoding="utf-8"?>
 <p:tagLst xmlns:a="http://schemas.openxmlformats.org/drawingml/2006/main" xmlns:r="http://schemas.openxmlformats.org/officeDocument/2006/relationships" xmlns:p="http://schemas.openxmlformats.org/presentationml/2006/main">
-  <p:tag name="NUM" val="2"/>
+  <p:tag name="NUM" val="1"/>
 </p:tagLst>
 </file>
 

</xml_diff>